<commit_message>
CS 220 Lecture 37 Database 3
</commit_message>
<xml_diff>
--- a/tyler/meena/cs220/s20/materials/lec_37_S20.pptx
+++ b/tyler/meena/cs220/s20/materials/lec_37_S20.pptx
@@ -5,16 +5,20 @@
     <p:sldMasterId id="2147483648" r:id="rId1"/>
   </p:sldMasterIdLst>
   <p:notesMasterIdLst>
-    <p:notesMasterId r:id="rId9"/>
+    <p:notesMasterId r:id="rId13"/>
   </p:notesMasterIdLst>
   <p:sldIdLst>
     <p:sldId id="326" r:id="rId2"/>
     <p:sldId id="327" r:id="rId3"/>
     <p:sldId id="328" r:id="rId4"/>
-    <p:sldId id="329" r:id="rId5"/>
-    <p:sldId id="333" r:id="rId6"/>
-    <p:sldId id="334" r:id="rId7"/>
-    <p:sldId id="335" r:id="rId8"/>
+    <p:sldId id="336" r:id="rId5"/>
+    <p:sldId id="330" r:id="rId6"/>
+    <p:sldId id="331" r:id="rId7"/>
+    <p:sldId id="332" r:id="rId8"/>
+    <p:sldId id="333" r:id="rId9"/>
+    <p:sldId id="334" r:id="rId10"/>
+    <p:sldId id="335" r:id="rId11"/>
+    <p:sldId id="337" r:id="rId12"/>
   </p:sldIdLst>
   <p:sldSz cx="13004800" cy="9753600"/>
   <p:notesSz cx="6858000" cy="9144000"/>
@@ -1935,7 +1939,7 @@
           </a:ln>
           <a:extLst>
             <a:ext uri="{C572A759-6A51-4108-AA02-DFA0A04FC94B}">
-              <ma14:wrappingTextBoxFlag xmlns:ma14="http://schemas.microsoft.com/office/mac/drawingml/2011/main" xmlns:a14="http://schemas.microsoft.com/office/drawing/2010/main" xmlns:m="http://schemas.openxmlformats.org/officeDocument/2006/math" xmlns="" val="1"/>
+              <ma14:wrappingTextBoxFlag xmlns="" xmlns:m="http://schemas.openxmlformats.org/officeDocument/2006/math" xmlns:a14="http://schemas.microsoft.com/office/drawing/2010/main" xmlns:ma14="http://schemas.microsoft.com/office/mac/drawingml/2011/main" val="1"/>
             </a:ext>
           </a:extLst>
         </p:spPr>
@@ -1974,7 +1978,7 @@
           </a:ln>
           <a:extLst>
             <a:ext uri="{C572A759-6A51-4108-AA02-DFA0A04FC94B}">
-              <ma14:wrappingTextBoxFlag xmlns:ma14="http://schemas.microsoft.com/office/mac/drawingml/2011/main" xmlns:a14="http://schemas.microsoft.com/office/drawing/2010/main" xmlns:m="http://schemas.openxmlformats.org/officeDocument/2006/math" xmlns="" val="1"/>
+              <ma14:wrappingTextBoxFlag xmlns="" xmlns:m="http://schemas.openxmlformats.org/officeDocument/2006/math" xmlns:a14="http://schemas.microsoft.com/office/drawing/2010/main" xmlns:ma14="http://schemas.microsoft.com/office/mac/drawingml/2011/main" val="1"/>
             </a:ext>
           </a:extLst>
         </p:spPr>
@@ -2933,6 +2937,897 @@
 </p:sld>
 </file>
 
+<file path=ppt/slides/slide10.xml><?xml version="1.0" encoding="utf-8"?>
+<p:sld xmlns:a="http://schemas.openxmlformats.org/drawingml/2006/main" xmlns:r="http://schemas.openxmlformats.org/officeDocument/2006/relationships" xmlns:p="http://schemas.openxmlformats.org/presentationml/2006/main">
+  <p:cSld>
+    <p:spTree>
+      <p:nvGrpSpPr>
+        <p:cNvPr id="1" name=""/>
+        <p:cNvGrpSpPr/>
+        <p:nvPr/>
+      </p:nvGrpSpPr>
+      <p:grpSpPr>
+        <a:xfrm>
+          <a:off x="0" y="0"/>
+          <a:ext cx="0" cy="0"/>
+          <a:chOff x="0" y="0"/>
+          <a:chExt cx="0" cy="0"/>
+        </a:xfrm>
+      </p:grpSpPr>
+      <p:sp>
+        <p:nvSpPr>
+          <p:cNvPr id="4" name="TextBox 3">
+            <a:extLst>
+              <a:ext uri="{FF2B5EF4-FFF2-40B4-BE49-F238E27FC236}">
+                <a16:creationId xmlns:a16="http://schemas.microsoft.com/office/drawing/2014/main" id="{D019A569-23AE-45AD-9384-2FBE7FF5DD3B}"/>
+              </a:ext>
+            </a:extLst>
+          </p:cNvPr>
+          <p:cNvSpPr txBox="1"/>
+          <p:nvPr/>
+        </p:nvSpPr>
+        <p:spPr>
+          <a:xfrm>
+            <a:off x="971550" y="4336932"/>
+            <a:ext cx="11061700" cy="595035"/>
+          </a:xfrm>
+          <a:prstGeom prst="rect">
+            <a:avLst/>
+          </a:prstGeom>
+          <a:noFill/>
+          <a:ln w="12700" cap="flat">
+            <a:noFill/>
+            <a:miter lim="400000"/>
+          </a:ln>
+          <a:effectLst/>
+          <a:sp3d/>
+        </p:spPr>
+        <p:style>
+          <a:lnRef idx="0">
+            <a:scrgbClr r="0" g="0" b="0"/>
+          </a:lnRef>
+          <a:fillRef idx="0">
+            <a:scrgbClr r="0" g="0" b="0"/>
+          </a:fillRef>
+          <a:effectRef idx="0">
+            <a:scrgbClr r="0" g="0" b="0"/>
+          </a:effectRef>
+          <a:fontRef idx="none"/>
+        </p:style>
+        <p:txBody>
+          <a:bodyPr rot="0" spcFirstLastPara="1" vertOverflow="overflow" horzOverflow="overflow" vert="horz" wrap="square" lIns="50800" tIns="50800" rIns="50800" bIns="50800" numCol="1" spcCol="38100" rtlCol="0" anchor="ctr">
+            <a:spAutoFit/>
+          </a:bodyPr>
+          <a:lstStyle/>
+          <a:p>
+            <a:r>
+              <a:rPr lang="en-US" sz="3200" b="0" dirty="0">
+                <a:latin typeface="Courier New" panose="02070309020205020404" pitchFamily="49" charset="0"/>
+                <a:cs typeface="Courier New" panose="02070309020205020404" pitchFamily="49" charset="0"/>
+              </a:rPr>
+              <a:t>trees</a:t>
+            </a:r>
+            <a:r>
+              <a:rPr lang="en-US" sz="3200" dirty="0">
+                <a:solidFill>
+                  <a:srgbClr val="00B0F0"/>
+                </a:solidFill>
+                <a:latin typeface="Courier New" panose="02070309020205020404" pitchFamily="49" charset="0"/>
+                <a:cs typeface="Courier New" panose="02070309020205020404" pitchFamily="49" charset="0"/>
+              </a:rPr>
+              <a:t>[</a:t>
+            </a:r>
+            <a:r>
+              <a:rPr lang="en-US" sz="3200" b="0" dirty="0">
+                <a:latin typeface="Courier New" panose="02070309020205020404" pitchFamily="49" charset="0"/>
+                <a:cs typeface="Courier New" panose="02070309020205020404" pitchFamily="49" charset="0"/>
+              </a:rPr>
+              <a:t>trees</a:t>
+            </a:r>
+            <a:r>
+              <a:rPr lang="en-US" sz="3200" dirty="0">
+                <a:solidFill>
+                  <a:srgbClr val="FF0000"/>
+                </a:solidFill>
+                <a:latin typeface="Courier New" panose="02070309020205020404" pitchFamily="49" charset="0"/>
+                <a:cs typeface="Courier New" panose="02070309020205020404" pitchFamily="49" charset="0"/>
+              </a:rPr>
+              <a:t>[</a:t>
+            </a:r>
+            <a:r>
+              <a:rPr lang="en-US" sz="3200" b="0" dirty="0">
+                <a:latin typeface="Courier New" panose="02070309020205020404" pitchFamily="49" charset="0"/>
+                <a:cs typeface="Courier New" panose="02070309020205020404" pitchFamily="49" charset="0"/>
+              </a:rPr>
+              <a:t>"priority"</a:t>
+            </a:r>
+            <a:r>
+              <a:rPr lang="en-US" sz="3200" dirty="0">
+                <a:solidFill>
+                  <a:srgbClr val="FF0000"/>
+                </a:solidFill>
+                <a:latin typeface="Courier New" panose="02070309020205020404" pitchFamily="49" charset="0"/>
+                <a:cs typeface="Courier New" panose="02070309020205020404" pitchFamily="49" charset="0"/>
+              </a:rPr>
+              <a:t>]</a:t>
+            </a:r>
+            <a:r>
+              <a:rPr lang="en-US" sz="3200" b="0" dirty="0">
+                <a:latin typeface="Courier New" panose="02070309020205020404" pitchFamily="49" charset="0"/>
+                <a:cs typeface="Courier New" panose="02070309020205020404" pitchFamily="49" charset="0"/>
+              </a:rPr>
+              <a:t> &gt; 90</a:t>
+            </a:r>
+            <a:r>
+              <a:rPr lang="en-US" sz="3200" dirty="0">
+                <a:solidFill>
+                  <a:srgbClr val="00B0F0"/>
+                </a:solidFill>
+                <a:latin typeface="Courier New" panose="02070309020205020404" pitchFamily="49" charset="0"/>
+                <a:cs typeface="Courier New" panose="02070309020205020404" pitchFamily="49" charset="0"/>
+              </a:rPr>
+              <a:t>]</a:t>
+            </a:r>
+            <a:r>
+              <a:rPr lang="en-US" sz="3200" dirty="0">
+                <a:solidFill>
+                  <a:srgbClr val="7030A0"/>
+                </a:solidFill>
+                <a:latin typeface="Courier New" panose="02070309020205020404" pitchFamily="49" charset="0"/>
+                <a:cs typeface="Courier New" panose="02070309020205020404" pitchFamily="49" charset="0"/>
+              </a:rPr>
+              <a:t>[</a:t>
+            </a:r>
+            <a:r>
+              <a:rPr lang="en-US" sz="3200" dirty="0">
+                <a:solidFill>
+                  <a:srgbClr val="00B050"/>
+                </a:solidFill>
+                <a:latin typeface="Courier New" panose="02070309020205020404" pitchFamily="49" charset="0"/>
+                <a:cs typeface="Courier New" panose="02070309020205020404" pitchFamily="49" charset="0"/>
+              </a:rPr>
+              <a:t>[</a:t>
+            </a:r>
+            <a:r>
+              <a:rPr lang="en-US" sz="3200" b="0" dirty="0">
+                <a:latin typeface="Courier New" panose="02070309020205020404" pitchFamily="49" charset="0"/>
+                <a:cs typeface="Courier New" panose="02070309020205020404" pitchFamily="49" charset="0"/>
+              </a:rPr>
+              <a:t>"x", "y"</a:t>
+            </a:r>
+            <a:r>
+              <a:rPr lang="en-US" sz="3200" dirty="0">
+                <a:solidFill>
+                  <a:srgbClr val="00B050"/>
+                </a:solidFill>
+                <a:latin typeface="Courier New" panose="02070309020205020404" pitchFamily="49" charset="0"/>
+                <a:cs typeface="Courier New" panose="02070309020205020404" pitchFamily="49" charset="0"/>
+              </a:rPr>
+              <a:t>]</a:t>
+            </a:r>
+            <a:r>
+              <a:rPr lang="en-US" sz="3200" dirty="0">
+                <a:solidFill>
+                  <a:srgbClr val="7030A0"/>
+                </a:solidFill>
+                <a:latin typeface="Courier New" panose="02070309020205020404" pitchFamily="49" charset="0"/>
+                <a:cs typeface="Courier New" panose="02070309020205020404" pitchFamily="49" charset="0"/>
+              </a:rPr>
+              <a:t>]</a:t>
+            </a:r>
+            <a:r>
+              <a:rPr lang="en-US" sz="3200" b="0" dirty="0">
+                <a:latin typeface="Courier New" panose="02070309020205020404" pitchFamily="49" charset="0"/>
+                <a:cs typeface="Courier New" panose="02070309020205020404" pitchFamily="49" charset="0"/>
+              </a:rPr>
+              <a:t> </a:t>
+            </a:r>
+            <a:endParaRPr kumimoji="0" lang="en-US" sz="3200" b="0" i="0" u="none" strike="noStrike" cap="none" spc="0" normalizeH="0" baseline="0" dirty="0">
+              <a:ln>
+                <a:noFill/>
+              </a:ln>
+              <a:solidFill>
+                <a:srgbClr val="000000"/>
+              </a:solidFill>
+              <a:effectLst/>
+              <a:uFillTx/>
+              <a:latin typeface="Courier New" panose="02070309020205020404" pitchFamily="49" charset="0"/>
+              <a:cs typeface="Courier New" panose="02070309020205020404" pitchFamily="49" charset="0"/>
+              <a:sym typeface="Gill Sans"/>
+            </a:endParaRPr>
+          </a:p>
+        </p:txBody>
+      </p:sp>
+      <p:pic>
+        <p:nvPicPr>
+          <p:cNvPr id="6" name="Picture 5">
+            <a:extLst>
+              <a:ext uri="{FF2B5EF4-FFF2-40B4-BE49-F238E27FC236}">
+                <a16:creationId xmlns:a16="http://schemas.microsoft.com/office/drawing/2014/main" id="{851715FA-A71D-467E-B8DD-289CFCAA666F}"/>
+              </a:ext>
+            </a:extLst>
+          </p:cNvPr>
+          <p:cNvPicPr>
+            <a:picLocks noChangeAspect="1"/>
+          </p:cNvPicPr>
+          <p:nvPr/>
+        </p:nvPicPr>
+        <p:blipFill rotWithShape="1">
+          <a:blip r:embed="rId2"/>
+          <a:srcRect t="21092" r="46289" b="33119"/>
+          <a:stretch/>
+        </p:blipFill>
+        <p:spPr>
+          <a:xfrm>
+            <a:off x="1473200" y="0"/>
+            <a:ext cx="9021912" cy="4326334"/>
+          </a:xfrm>
+          <a:prstGeom prst="rect">
+            <a:avLst/>
+          </a:prstGeom>
+        </p:spPr>
+      </p:pic>
+      <p:sp>
+        <p:nvSpPr>
+          <p:cNvPr id="8" name="Right Brace 7">
+            <a:extLst>
+              <a:ext uri="{FF2B5EF4-FFF2-40B4-BE49-F238E27FC236}">
+                <a16:creationId xmlns:a16="http://schemas.microsoft.com/office/drawing/2014/main" id="{E41D51F2-9502-4075-974E-D6F03118AB3B}"/>
+              </a:ext>
+            </a:extLst>
+          </p:cNvPr>
+          <p:cNvSpPr/>
+          <p:nvPr/>
+        </p:nvSpPr>
+        <p:spPr>
+          <a:xfrm rot="5400000">
+            <a:off x="6318250" y="86917"/>
+            <a:ext cx="495300" cy="10185400"/>
+          </a:xfrm>
+          <a:prstGeom prst="rightBrace">
+            <a:avLst/>
+          </a:prstGeom>
+          <a:ln w="38100">
+            <a:solidFill>
+              <a:schemeClr val="tx1"/>
+            </a:solidFill>
+          </a:ln>
+        </p:spPr>
+        <p:style>
+          <a:lnRef idx="1">
+            <a:schemeClr val="accent5"/>
+          </a:lnRef>
+          <a:fillRef idx="0">
+            <a:schemeClr val="accent5"/>
+          </a:fillRef>
+          <a:effectRef idx="0">
+            <a:schemeClr val="accent5"/>
+          </a:effectRef>
+          <a:fontRef idx="minor">
+            <a:schemeClr val="tx1"/>
+          </a:fontRef>
+        </p:style>
+        <p:txBody>
+          <a:bodyPr rot="0" spcFirstLastPara="1" vertOverflow="overflow" horzOverflow="overflow" vert="horz" wrap="square" lIns="91439" tIns="45719" rIns="91439" bIns="45719" numCol="1" spcCol="38100" rtlCol="0" anchor="t">
+            <a:noAutofit/>
+          </a:bodyPr>
+          <a:lstStyle/>
+          <a:p>
+            <a:pPr marL="0" marR="0" indent="0" algn="l" defTabSz="914400" rtl="0" fontAlgn="auto" latinLnBrk="1" hangingPunct="0">
+              <a:lnSpc>
+                <a:spcPct val="100000"/>
+              </a:lnSpc>
+              <a:spcBef>
+                <a:spcPts val="0"/>
+              </a:spcBef>
+              <a:spcAft>
+                <a:spcPts val="0"/>
+              </a:spcAft>
+              <a:buClrTx/>
+              <a:buSzTx/>
+              <a:buFontTx/>
+              <a:buNone/>
+              <a:tabLst/>
+            </a:pPr>
+            <a:endParaRPr kumimoji="0" lang="en-US" sz="1800" i="0" u="none" strike="noStrike" cap="none" spc="0" normalizeH="0" baseline="0" dirty="0">
+              <a:ln>
+                <a:noFill/>
+              </a:ln>
+              <a:solidFill>
+                <a:srgbClr val="000000"/>
+              </a:solidFill>
+              <a:effectLst/>
+              <a:uFillTx/>
+            </a:endParaRPr>
+          </a:p>
+        </p:txBody>
+      </p:sp>
+      <p:pic>
+        <p:nvPicPr>
+          <p:cNvPr id="2" name="Picture 1">
+            <a:extLst>
+              <a:ext uri="{FF2B5EF4-FFF2-40B4-BE49-F238E27FC236}">
+                <a16:creationId xmlns:a16="http://schemas.microsoft.com/office/drawing/2014/main" id="{CB741217-989D-4289-83D5-63846500D141}"/>
+              </a:ext>
+            </a:extLst>
+          </p:cNvPr>
+          <p:cNvPicPr>
+            <a:picLocks noChangeAspect="1"/>
+          </p:cNvPicPr>
+          <p:nvPr/>
+        </p:nvPicPr>
+        <p:blipFill>
+          <a:blip r:embed="rId3"/>
+          <a:stretch>
+            <a:fillRect/>
+          </a:stretch>
+        </p:blipFill>
+        <p:spPr>
+          <a:xfrm>
+            <a:off x="1916077" y="5646286"/>
+            <a:ext cx="9172645" cy="3256413"/>
+          </a:xfrm>
+          <a:prstGeom prst="rect">
+            <a:avLst/>
+          </a:prstGeom>
+        </p:spPr>
+      </p:pic>
+    </p:spTree>
+    <p:extLst>
+      <p:ext uri="{BB962C8B-B14F-4D97-AF65-F5344CB8AC3E}">
+        <p14:creationId xmlns:p14="http://schemas.microsoft.com/office/powerpoint/2010/main" val="613121539"/>
+      </p:ext>
+    </p:extLst>
+  </p:cSld>
+  <p:clrMapOvr>
+    <a:masterClrMapping/>
+  </p:clrMapOvr>
+  <p:transition spd="med"/>
+</p:sld>
+</file>
+
+<file path=ppt/slides/slide11.xml><?xml version="1.0" encoding="utf-8"?>
+<p:sld xmlns:a="http://schemas.openxmlformats.org/drawingml/2006/main" xmlns:r="http://schemas.openxmlformats.org/officeDocument/2006/relationships" xmlns:p="http://schemas.openxmlformats.org/presentationml/2006/main">
+  <p:cSld>
+    <p:spTree>
+      <p:nvGrpSpPr>
+        <p:cNvPr id="1" name=""/>
+        <p:cNvGrpSpPr/>
+        <p:nvPr/>
+      </p:nvGrpSpPr>
+      <p:grpSpPr>
+        <a:xfrm>
+          <a:off x="0" y="0"/>
+          <a:ext cx="0" cy="0"/>
+          <a:chOff x="0" y="0"/>
+          <a:chExt cx="0" cy="0"/>
+        </a:xfrm>
+      </p:grpSpPr>
+      <p:sp>
+        <p:nvSpPr>
+          <p:cNvPr id="4" name="TextBox 3">
+            <a:extLst>
+              <a:ext uri="{FF2B5EF4-FFF2-40B4-BE49-F238E27FC236}">
+                <a16:creationId xmlns:a16="http://schemas.microsoft.com/office/drawing/2014/main" id="{D019A569-23AE-45AD-9384-2FBE7FF5DD3B}"/>
+              </a:ext>
+            </a:extLst>
+          </p:cNvPr>
+          <p:cNvSpPr txBox="1"/>
+          <p:nvPr/>
+        </p:nvSpPr>
+        <p:spPr>
+          <a:xfrm>
+            <a:off x="971550" y="4336932"/>
+            <a:ext cx="11061700" cy="595035"/>
+          </a:xfrm>
+          <a:prstGeom prst="rect">
+            <a:avLst/>
+          </a:prstGeom>
+          <a:noFill/>
+          <a:ln w="12700" cap="flat">
+            <a:noFill/>
+            <a:miter lim="400000"/>
+          </a:ln>
+          <a:effectLst/>
+          <a:sp3d/>
+        </p:spPr>
+        <p:style>
+          <a:lnRef idx="0">
+            <a:scrgbClr r="0" g="0" b="0"/>
+          </a:lnRef>
+          <a:fillRef idx="0">
+            <a:scrgbClr r="0" g="0" b="0"/>
+          </a:fillRef>
+          <a:effectRef idx="0">
+            <a:scrgbClr r="0" g="0" b="0"/>
+          </a:effectRef>
+          <a:fontRef idx="none"/>
+        </p:style>
+        <p:txBody>
+          <a:bodyPr rot="0" spcFirstLastPara="1" vertOverflow="overflow" horzOverflow="overflow" vert="horz" wrap="square" lIns="50800" tIns="50800" rIns="50800" bIns="50800" numCol="1" spcCol="38100" rtlCol="0" anchor="ctr">
+            <a:spAutoFit/>
+          </a:bodyPr>
+          <a:lstStyle/>
+          <a:p>
+            <a:r>
+              <a:rPr lang="en-US" sz="3200" b="0" dirty="0">
+                <a:latin typeface="Courier New" panose="02070309020205020404" pitchFamily="49" charset="0"/>
+                <a:cs typeface="Courier New" panose="02070309020205020404" pitchFamily="49" charset="0"/>
+              </a:rPr>
+              <a:t>trees</a:t>
+            </a:r>
+            <a:r>
+              <a:rPr lang="en-US" sz="3200" dirty="0">
+                <a:solidFill>
+                  <a:srgbClr val="00B0F0"/>
+                </a:solidFill>
+                <a:latin typeface="Courier New" panose="02070309020205020404" pitchFamily="49" charset="0"/>
+                <a:cs typeface="Courier New" panose="02070309020205020404" pitchFamily="49" charset="0"/>
+              </a:rPr>
+              <a:t>[</a:t>
+            </a:r>
+            <a:r>
+              <a:rPr lang="en-US" sz="3200" b="0" dirty="0">
+                <a:latin typeface="Courier New" panose="02070309020205020404" pitchFamily="49" charset="0"/>
+                <a:cs typeface="Courier New" panose="02070309020205020404" pitchFamily="49" charset="0"/>
+              </a:rPr>
+              <a:t>trees</a:t>
+            </a:r>
+            <a:r>
+              <a:rPr lang="en-US" sz="3200" dirty="0">
+                <a:solidFill>
+                  <a:srgbClr val="FF0000"/>
+                </a:solidFill>
+                <a:latin typeface="Courier New" panose="02070309020205020404" pitchFamily="49" charset="0"/>
+                <a:cs typeface="Courier New" panose="02070309020205020404" pitchFamily="49" charset="0"/>
+              </a:rPr>
+              <a:t>[</a:t>
+            </a:r>
+            <a:r>
+              <a:rPr lang="en-US" sz="3200" b="0" dirty="0">
+                <a:latin typeface="Courier New" panose="02070309020205020404" pitchFamily="49" charset="0"/>
+                <a:cs typeface="Courier New" panose="02070309020205020404" pitchFamily="49" charset="0"/>
+              </a:rPr>
+              <a:t>"priority"</a:t>
+            </a:r>
+            <a:r>
+              <a:rPr lang="en-US" sz="3200" dirty="0">
+                <a:solidFill>
+                  <a:srgbClr val="FF0000"/>
+                </a:solidFill>
+                <a:latin typeface="Courier New" panose="02070309020205020404" pitchFamily="49" charset="0"/>
+                <a:cs typeface="Courier New" panose="02070309020205020404" pitchFamily="49" charset="0"/>
+              </a:rPr>
+              <a:t>]</a:t>
+            </a:r>
+            <a:r>
+              <a:rPr lang="en-US" sz="3200" b="0" dirty="0">
+                <a:latin typeface="Courier New" panose="02070309020205020404" pitchFamily="49" charset="0"/>
+                <a:cs typeface="Courier New" panose="02070309020205020404" pitchFamily="49" charset="0"/>
+              </a:rPr>
+              <a:t> &gt; 90</a:t>
+            </a:r>
+            <a:r>
+              <a:rPr lang="en-US" sz="3200" dirty="0">
+                <a:solidFill>
+                  <a:srgbClr val="00B0F0"/>
+                </a:solidFill>
+                <a:latin typeface="Courier New" panose="02070309020205020404" pitchFamily="49" charset="0"/>
+                <a:cs typeface="Courier New" panose="02070309020205020404" pitchFamily="49" charset="0"/>
+              </a:rPr>
+              <a:t>]</a:t>
+            </a:r>
+            <a:r>
+              <a:rPr lang="en-US" sz="3200" dirty="0">
+                <a:solidFill>
+                  <a:srgbClr val="7030A0"/>
+                </a:solidFill>
+                <a:latin typeface="Courier New" panose="02070309020205020404" pitchFamily="49" charset="0"/>
+                <a:cs typeface="Courier New" panose="02070309020205020404" pitchFamily="49" charset="0"/>
+              </a:rPr>
+              <a:t>[</a:t>
+            </a:r>
+            <a:r>
+              <a:rPr lang="en-US" sz="3200" dirty="0">
+                <a:solidFill>
+                  <a:srgbClr val="00B050"/>
+                </a:solidFill>
+                <a:latin typeface="Courier New" panose="02070309020205020404" pitchFamily="49" charset="0"/>
+                <a:cs typeface="Courier New" panose="02070309020205020404" pitchFamily="49" charset="0"/>
+              </a:rPr>
+              <a:t>[</a:t>
+            </a:r>
+            <a:r>
+              <a:rPr lang="en-US" sz="3200" b="0" dirty="0">
+                <a:latin typeface="Courier New" panose="02070309020205020404" pitchFamily="49" charset="0"/>
+                <a:cs typeface="Courier New" panose="02070309020205020404" pitchFamily="49" charset="0"/>
+              </a:rPr>
+              <a:t>"x", "y"</a:t>
+            </a:r>
+            <a:r>
+              <a:rPr lang="en-US" sz="3200" dirty="0">
+                <a:solidFill>
+                  <a:srgbClr val="00B050"/>
+                </a:solidFill>
+                <a:latin typeface="Courier New" panose="02070309020205020404" pitchFamily="49" charset="0"/>
+                <a:cs typeface="Courier New" panose="02070309020205020404" pitchFamily="49" charset="0"/>
+              </a:rPr>
+              <a:t>]</a:t>
+            </a:r>
+            <a:r>
+              <a:rPr lang="en-US" sz="3200" dirty="0">
+                <a:solidFill>
+                  <a:srgbClr val="7030A0"/>
+                </a:solidFill>
+                <a:latin typeface="Courier New" panose="02070309020205020404" pitchFamily="49" charset="0"/>
+                <a:cs typeface="Courier New" panose="02070309020205020404" pitchFamily="49" charset="0"/>
+              </a:rPr>
+              <a:t>]</a:t>
+            </a:r>
+            <a:r>
+              <a:rPr lang="en-US" sz="3200" b="0" dirty="0">
+                <a:latin typeface="Courier New" panose="02070309020205020404" pitchFamily="49" charset="0"/>
+                <a:cs typeface="Courier New" panose="02070309020205020404" pitchFamily="49" charset="0"/>
+              </a:rPr>
+              <a:t> </a:t>
+            </a:r>
+            <a:endParaRPr kumimoji="0" lang="en-US" sz="3200" b="0" i="0" u="none" strike="noStrike" cap="none" spc="0" normalizeH="0" baseline="0" dirty="0">
+              <a:ln>
+                <a:noFill/>
+              </a:ln>
+              <a:solidFill>
+                <a:srgbClr val="000000"/>
+              </a:solidFill>
+              <a:effectLst/>
+              <a:uFillTx/>
+              <a:latin typeface="Courier New" panose="02070309020205020404" pitchFamily="49" charset="0"/>
+              <a:cs typeface="Courier New" panose="02070309020205020404" pitchFamily="49" charset="0"/>
+              <a:sym typeface="Gill Sans"/>
+            </a:endParaRPr>
+          </a:p>
+        </p:txBody>
+      </p:sp>
+      <p:sp>
+        <p:nvSpPr>
+          <p:cNvPr id="5" name="Right Brace 4">
+            <a:extLst>
+              <a:ext uri="{FF2B5EF4-FFF2-40B4-BE49-F238E27FC236}">
+                <a16:creationId xmlns:a16="http://schemas.microsoft.com/office/drawing/2014/main" id="{2D6A4E87-43FF-4D2A-BA0E-C24E07DCB8FD}"/>
+              </a:ext>
+            </a:extLst>
+          </p:cNvPr>
+          <p:cNvSpPr/>
+          <p:nvPr/>
+        </p:nvSpPr>
+        <p:spPr>
+          <a:xfrm rot="5400000">
+            <a:off x="9848850" y="4176317"/>
+            <a:ext cx="495300" cy="2209800"/>
+          </a:xfrm>
+          <a:prstGeom prst="rightBrace">
+            <a:avLst/>
+          </a:prstGeom>
+          <a:ln w="38100">
+            <a:solidFill>
+              <a:srgbClr val="00B050"/>
+            </a:solidFill>
+          </a:ln>
+        </p:spPr>
+        <p:style>
+          <a:lnRef idx="1">
+            <a:schemeClr val="accent5"/>
+          </a:lnRef>
+          <a:fillRef idx="0">
+            <a:schemeClr val="accent5"/>
+          </a:fillRef>
+          <a:effectRef idx="0">
+            <a:schemeClr val="accent5"/>
+          </a:effectRef>
+          <a:fontRef idx="minor">
+            <a:schemeClr val="tx1"/>
+          </a:fontRef>
+        </p:style>
+        <p:txBody>
+          <a:bodyPr rot="0" spcFirstLastPara="1" vertOverflow="overflow" horzOverflow="overflow" vert="horz" wrap="square" lIns="91439" tIns="45719" rIns="91439" bIns="45719" numCol="1" spcCol="38100" rtlCol="0" anchor="t">
+            <a:noAutofit/>
+          </a:bodyPr>
+          <a:lstStyle/>
+          <a:p>
+            <a:pPr marL="0" marR="0" indent="0" algn="l" defTabSz="914400" rtl="0" fontAlgn="auto" latinLnBrk="1" hangingPunct="0">
+              <a:lnSpc>
+                <a:spcPct val="100000"/>
+              </a:lnSpc>
+              <a:spcBef>
+                <a:spcPts val="0"/>
+              </a:spcBef>
+              <a:spcAft>
+                <a:spcPts val="0"/>
+              </a:spcAft>
+              <a:buClrTx/>
+              <a:buSzTx/>
+              <a:buFontTx/>
+              <a:buNone/>
+              <a:tabLst/>
+            </a:pPr>
+            <a:endParaRPr kumimoji="0" lang="en-US" sz="1800" i="0" u="none" strike="noStrike" cap="none" spc="0" normalizeH="0" baseline="0" dirty="0">
+              <a:ln>
+                <a:noFill/>
+              </a:ln>
+              <a:solidFill>
+                <a:srgbClr val="000000"/>
+              </a:solidFill>
+              <a:effectLst/>
+              <a:uFillTx/>
+            </a:endParaRPr>
+          </a:p>
+        </p:txBody>
+      </p:sp>
+      <p:pic>
+        <p:nvPicPr>
+          <p:cNvPr id="6" name="Picture 5">
+            <a:extLst>
+              <a:ext uri="{FF2B5EF4-FFF2-40B4-BE49-F238E27FC236}">
+                <a16:creationId xmlns:a16="http://schemas.microsoft.com/office/drawing/2014/main" id="{851715FA-A71D-467E-B8DD-289CFCAA666F}"/>
+              </a:ext>
+            </a:extLst>
+          </p:cNvPr>
+          <p:cNvPicPr>
+            <a:picLocks noChangeAspect="1"/>
+          </p:cNvPicPr>
+          <p:nvPr/>
+        </p:nvPicPr>
+        <p:blipFill rotWithShape="1">
+          <a:blip r:embed="rId2"/>
+          <a:srcRect t="21092" r="46289" b="33119"/>
+          <a:stretch/>
+        </p:blipFill>
+        <p:spPr>
+          <a:xfrm>
+            <a:off x="1473200" y="0"/>
+            <a:ext cx="9021912" cy="4326334"/>
+          </a:xfrm>
+          <a:prstGeom prst="rect">
+            <a:avLst/>
+          </a:prstGeom>
+        </p:spPr>
+      </p:pic>
+      <p:sp>
+        <p:nvSpPr>
+          <p:cNvPr id="7" name="TextBox 6">
+            <a:extLst>
+              <a:ext uri="{FF2B5EF4-FFF2-40B4-BE49-F238E27FC236}">
+                <a16:creationId xmlns:a16="http://schemas.microsoft.com/office/drawing/2014/main" id="{0625623F-2AB3-4747-BB90-E6799E279B9A}"/>
+              </a:ext>
+            </a:extLst>
+          </p:cNvPr>
+          <p:cNvSpPr txBox="1"/>
+          <p:nvPr/>
+        </p:nvSpPr>
+        <p:spPr>
+          <a:xfrm>
+            <a:off x="1111250" y="5630467"/>
+            <a:ext cx="11061700" cy="595035"/>
+          </a:xfrm>
+          <a:prstGeom prst="rect">
+            <a:avLst/>
+          </a:prstGeom>
+          <a:noFill/>
+          <a:ln w="12700" cap="flat">
+            <a:noFill/>
+            <a:miter lim="400000"/>
+          </a:ln>
+          <a:effectLst/>
+          <a:sp3d/>
+        </p:spPr>
+        <p:style>
+          <a:lnRef idx="0">
+            <a:scrgbClr r="0" g="0" b="0"/>
+          </a:lnRef>
+          <a:fillRef idx="0">
+            <a:scrgbClr r="0" g="0" b="0"/>
+          </a:fillRef>
+          <a:effectRef idx="0">
+            <a:scrgbClr r="0" g="0" b="0"/>
+          </a:effectRef>
+          <a:fontRef idx="none"/>
+        </p:style>
+        <p:txBody>
+          <a:bodyPr rot="0" spcFirstLastPara="1" vertOverflow="overflow" horzOverflow="overflow" vert="horz" wrap="square" lIns="50800" tIns="50800" rIns="50800" bIns="50800" numCol="1" spcCol="38100" rtlCol="0" anchor="ctr">
+            <a:spAutoFit/>
+          </a:bodyPr>
+          <a:lstStyle/>
+          <a:p>
+            <a:r>
+              <a:rPr lang="en-US" sz="3200" dirty="0">
+                <a:solidFill>
+                  <a:srgbClr val="00B0F0"/>
+                </a:solidFill>
+                <a:latin typeface="Courier New" panose="02070309020205020404" pitchFamily="49" charset="0"/>
+                <a:cs typeface="Courier New" panose="02070309020205020404" pitchFamily="49" charset="0"/>
+              </a:rPr>
+              <a:t>         Where            </a:t>
+            </a:r>
+            <a:r>
+              <a:rPr lang="en-US" sz="3200" dirty="0">
+                <a:solidFill>
+                  <a:srgbClr val="7030A0"/>
+                </a:solidFill>
+                <a:latin typeface="Courier New" panose="02070309020205020404" pitchFamily="49" charset="0"/>
+                <a:cs typeface="Courier New" panose="02070309020205020404" pitchFamily="49" charset="0"/>
+              </a:rPr>
+              <a:t>Select</a:t>
+            </a:r>
+            <a:r>
+              <a:rPr lang="en-US" sz="3200" b="0" dirty="0">
+                <a:latin typeface="Courier New" panose="02070309020205020404" pitchFamily="49" charset="0"/>
+                <a:cs typeface="Courier New" panose="02070309020205020404" pitchFamily="49" charset="0"/>
+              </a:rPr>
+              <a:t>      </a:t>
+            </a:r>
+            <a:endParaRPr kumimoji="0" lang="en-US" sz="3200" b="0" i="0" u="none" strike="noStrike" cap="none" spc="0" normalizeH="0" baseline="0" dirty="0">
+              <a:ln>
+                <a:noFill/>
+              </a:ln>
+              <a:solidFill>
+                <a:srgbClr val="000000"/>
+              </a:solidFill>
+              <a:effectLst/>
+              <a:uFillTx/>
+              <a:latin typeface="Courier New" panose="02070309020205020404" pitchFamily="49" charset="0"/>
+              <a:cs typeface="Courier New" panose="02070309020205020404" pitchFamily="49" charset="0"/>
+              <a:sym typeface="Gill Sans"/>
+            </a:endParaRPr>
+          </a:p>
+        </p:txBody>
+      </p:sp>
+      <p:sp>
+        <p:nvSpPr>
+          <p:cNvPr id="8" name="Right Brace 7">
+            <a:extLst>
+              <a:ext uri="{FF2B5EF4-FFF2-40B4-BE49-F238E27FC236}">
+                <a16:creationId xmlns:a16="http://schemas.microsoft.com/office/drawing/2014/main" id="{E41D51F2-9502-4075-974E-D6F03118AB3B}"/>
+              </a:ext>
+            </a:extLst>
+          </p:cNvPr>
+          <p:cNvSpPr/>
+          <p:nvPr/>
+        </p:nvSpPr>
+        <p:spPr>
+          <a:xfrm rot="5400000">
+            <a:off x="5410200" y="2391967"/>
+            <a:ext cx="495300" cy="5575300"/>
+          </a:xfrm>
+          <a:prstGeom prst="rightBrace">
+            <a:avLst/>
+          </a:prstGeom>
+          <a:ln w="38100">
+            <a:solidFill>
+              <a:srgbClr val="00B0F0"/>
+            </a:solidFill>
+          </a:ln>
+        </p:spPr>
+        <p:style>
+          <a:lnRef idx="1">
+            <a:schemeClr val="accent5"/>
+          </a:lnRef>
+          <a:fillRef idx="0">
+            <a:schemeClr val="accent5"/>
+          </a:fillRef>
+          <a:effectRef idx="0">
+            <a:schemeClr val="accent5"/>
+          </a:effectRef>
+          <a:fontRef idx="minor">
+            <a:schemeClr val="tx1"/>
+          </a:fontRef>
+        </p:style>
+        <p:txBody>
+          <a:bodyPr rot="0" spcFirstLastPara="1" vertOverflow="overflow" horzOverflow="overflow" vert="horz" wrap="square" lIns="91439" tIns="45719" rIns="91439" bIns="45719" numCol="1" spcCol="38100" rtlCol="0" anchor="t">
+            <a:noAutofit/>
+          </a:bodyPr>
+          <a:lstStyle/>
+          <a:p>
+            <a:pPr marL="0" marR="0" indent="0" algn="l" defTabSz="914400" rtl="0" fontAlgn="auto" latinLnBrk="1" hangingPunct="0">
+              <a:lnSpc>
+                <a:spcPct val="100000"/>
+              </a:lnSpc>
+              <a:spcBef>
+                <a:spcPts val="0"/>
+              </a:spcBef>
+              <a:spcAft>
+                <a:spcPts val="0"/>
+              </a:spcAft>
+              <a:buClrTx/>
+              <a:buSzTx/>
+              <a:buFontTx/>
+              <a:buNone/>
+              <a:tabLst/>
+            </a:pPr>
+            <a:endParaRPr kumimoji="0" lang="en-US" sz="1800" i="0" u="none" strike="noStrike" cap="none" spc="0" normalizeH="0" baseline="0" dirty="0">
+              <a:ln>
+                <a:noFill/>
+              </a:ln>
+              <a:solidFill>
+                <a:srgbClr val="000000"/>
+              </a:solidFill>
+              <a:effectLst/>
+              <a:uFillTx/>
+            </a:endParaRPr>
+          </a:p>
+        </p:txBody>
+      </p:sp>
+      <p:pic>
+        <p:nvPicPr>
+          <p:cNvPr id="9" name="Picture 8">
+            <a:extLst>
+              <a:ext uri="{FF2B5EF4-FFF2-40B4-BE49-F238E27FC236}">
+                <a16:creationId xmlns:a16="http://schemas.microsoft.com/office/drawing/2014/main" id="{407A3330-1902-432F-B512-256B15A73E3A}"/>
+              </a:ext>
+            </a:extLst>
+          </p:cNvPr>
+          <p:cNvPicPr>
+            <a:picLocks noChangeAspect="1"/>
+          </p:cNvPicPr>
+          <p:nvPr/>
+        </p:nvPicPr>
+        <p:blipFill>
+          <a:blip r:embed="rId3"/>
+          <a:stretch>
+            <a:fillRect/>
+          </a:stretch>
+        </p:blipFill>
+        <p:spPr>
+          <a:xfrm>
+            <a:off x="1581151" y="6327102"/>
+            <a:ext cx="6483350" cy="2929670"/>
+          </a:xfrm>
+          <a:prstGeom prst="rect">
+            <a:avLst/>
+          </a:prstGeom>
+        </p:spPr>
+      </p:pic>
+      <p:pic>
+        <p:nvPicPr>
+          <p:cNvPr id="10" name="Picture 9">
+            <a:extLst>
+              <a:ext uri="{FF2B5EF4-FFF2-40B4-BE49-F238E27FC236}">
+                <a16:creationId xmlns:a16="http://schemas.microsoft.com/office/drawing/2014/main" id="{D7AB1599-BB78-412F-A477-97027E40663D}"/>
+              </a:ext>
+            </a:extLst>
+          </p:cNvPr>
+          <p:cNvPicPr>
+            <a:picLocks noChangeAspect="1"/>
+          </p:cNvPicPr>
+          <p:nvPr/>
+        </p:nvPicPr>
+        <p:blipFill rotWithShape="1">
+          <a:blip r:embed="rId4"/>
+          <a:srcRect t="35260" r="73260"/>
+          <a:stretch/>
+        </p:blipFill>
+        <p:spPr>
+          <a:xfrm>
+            <a:off x="9129677" y="6327102"/>
+            <a:ext cx="2452723" cy="2108199"/>
+          </a:xfrm>
+          <a:prstGeom prst="rect">
+            <a:avLst/>
+          </a:prstGeom>
+        </p:spPr>
+      </p:pic>
+    </p:spTree>
+    <p:extLst>
+      <p:ext uri="{BB962C8B-B14F-4D97-AF65-F5344CB8AC3E}">
+        <p14:creationId xmlns:p14="http://schemas.microsoft.com/office/powerpoint/2010/main" val="1235534359"/>
+      </p:ext>
+    </p:extLst>
+  </p:cSld>
+  <p:clrMapOvr>
+    <a:masterClrMapping/>
+  </p:clrMapOvr>
+  <p:transition spd="med"/>
+</p:sld>
+</file>
+
 <file path=ppt/slides/slide2.xml><?xml version="1.0" encoding="utf-8"?>
 <p:sld xmlns:a="http://schemas.openxmlformats.org/drawingml/2006/main" xmlns:r="http://schemas.openxmlformats.org/officeDocument/2006/relationships" xmlns:p="http://schemas.openxmlformats.org/presentationml/2006/main">
   <p:cSld>
@@ -3015,12 +3910,147 @@
               <a:spcBef>
                 <a:spcPts val="0"/>
               </a:spcBef>
+              <a:spcAft>
+                <a:spcPts val="800"/>
+              </a:spcAft>
               <a:buSzTx/>
             </a:pPr>
             <a:r>
               <a:rPr lang="en-US" dirty="0"/>
-              <a:t>P9 is due Friday April 17 - Today</a:t>
-            </a:r>
+              <a:t>P10  - Due Friday May 1</a:t>
+            </a:r>
+          </a:p>
+          <a:p>
+            <a:pPr>
+              <a:spcBef>
+                <a:spcPts val="0"/>
+              </a:spcBef>
+              <a:spcAft>
+                <a:spcPts val="800"/>
+              </a:spcAft>
+              <a:buSzTx/>
+            </a:pPr>
+            <a:r>
+              <a:rPr lang="en-US" dirty="0"/>
+              <a:t>Late Days may not be used</a:t>
+            </a:r>
+          </a:p>
+          <a:p>
+            <a:pPr>
+              <a:spcBef>
+                <a:spcPts val="0"/>
+              </a:spcBef>
+              <a:spcAft>
+                <a:spcPts val="800"/>
+              </a:spcAft>
+              <a:buSzTx/>
+            </a:pPr>
+            <a:r>
+              <a:rPr lang="en-US" dirty="0"/>
+              <a:t>Point Redistribution</a:t>
+            </a:r>
+          </a:p>
+          <a:p>
+            <a:pPr>
+              <a:spcBef>
+                <a:spcPts val="0"/>
+              </a:spcBef>
+              <a:spcAft>
+                <a:spcPts val="800"/>
+              </a:spcAft>
+              <a:buSzTx/>
+            </a:pPr>
+            <a:r>
+              <a:rPr lang="en-US" dirty="0"/>
+              <a:t>Final Project - Thursday April 23 (end of the day)</a:t>
+            </a:r>
+          </a:p>
+          <a:p>
+            <a:pPr>
+              <a:spcBef>
+                <a:spcPts val="0"/>
+              </a:spcBef>
+              <a:spcAft>
+                <a:spcPts val="800"/>
+              </a:spcAft>
+              <a:buSzTx/>
+            </a:pPr>
+            <a:r>
+              <a:rPr lang="en-US" dirty="0"/>
+              <a:t>Grading / Resubmission / Deadline Extension – Google Form</a:t>
+            </a:r>
+          </a:p>
+          <a:p>
+            <a:pPr>
+              <a:spcBef>
+                <a:spcPts val="0"/>
+              </a:spcBef>
+              <a:spcAft>
+                <a:spcPts val="800"/>
+              </a:spcAft>
+              <a:buSzTx/>
+            </a:pPr>
+            <a:r>
+              <a:rPr lang="en-US" dirty="0"/>
+              <a:t>Course Evaluations </a:t>
+            </a:r>
+          </a:p>
+          <a:p>
+            <a:pPr>
+              <a:spcBef>
+                <a:spcPts val="0"/>
+              </a:spcBef>
+              <a:spcAft>
+                <a:spcPts val="800"/>
+              </a:spcAft>
+              <a:buSzTx/>
+            </a:pPr>
+            <a:r>
+              <a:rPr lang="en-US" dirty="0"/>
+              <a:t>What are professors in other classes doing that’s working well</a:t>
+            </a:r>
+          </a:p>
+          <a:p>
+            <a:pPr lvl="2">
+              <a:spcBef>
+                <a:spcPts val="0"/>
+              </a:spcBef>
+              <a:spcAft>
+                <a:spcPts val="800"/>
+              </a:spcAft>
+              <a:buSzTx/>
+            </a:pPr>
+            <a:r>
+              <a:rPr lang="en-US" dirty="0"/>
+              <a:t>Exams???</a:t>
+            </a:r>
+          </a:p>
+          <a:p>
+            <a:pPr>
+              <a:spcBef>
+                <a:spcPts val="0"/>
+              </a:spcBef>
+              <a:spcAft>
+                <a:spcPts val="800"/>
+              </a:spcAft>
+              <a:buSzTx/>
+            </a:pPr>
+            <a:r>
+              <a:rPr lang="en-US" dirty="0"/>
+              <a:t>Lecture Feedback – Databases 2</a:t>
+            </a:r>
+          </a:p>
+          <a:p>
+            <a:pPr lvl="2">
+              <a:spcBef>
+                <a:spcPts val="0"/>
+              </a:spcBef>
+              <a:spcAft>
+                <a:spcPts val="800"/>
+              </a:spcAft>
+              <a:buSzTx/>
+            </a:pPr>
+            <a:endParaRPr lang="en-US" dirty="0"/>
           </a:p>
           <a:p>
             <a:pPr>
@@ -3029,34 +4059,7 @@
               </a:spcBef>
               <a:buSzTx/>
             </a:pPr>
-            <a:r>
-              <a:rPr lang="en-US" dirty="0"/>
-              <a:t>P10 has been released</a:t>
-            </a:r>
-          </a:p>
-          <a:p>
-            <a:pPr lvl="2">
-              <a:spcBef>
-                <a:spcPts val="0"/>
-              </a:spcBef>
-              <a:buSzTx/>
-            </a:pPr>
-            <a:r>
-              <a:rPr lang="en-US" dirty="0"/>
-              <a:t>Due Friday May 1</a:t>
-            </a:r>
-          </a:p>
-          <a:p>
-            <a:pPr lvl="2">
-              <a:spcBef>
-                <a:spcPts val="0"/>
-              </a:spcBef>
-              <a:buSzTx/>
-            </a:pPr>
-            <a:r>
-              <a:rPr lang="en-US" dirty="0"/>
-              <a:t>Late Days may not be used</a:t>
-            </a:r>
+            <a:endParaRPr lang="en-US" dirty="0"/>
           </a:p>
           <a:p>
             <a:pPr>
@@ -3065,46 +4068,7 @@
               </a:spcBef>
               <a:buSzTx/>
             </a:pPr>
-            <a:r>
-              <a:rPr lang="en-US" dirty="0"/>
-              <a:t>Final Project </a:t>
-            </a:r>
-          </a:p>
-          <a:p>
-            <a:pPr>
-              <a:spcBef>
-                <a:spcPts val="0"/>
-              </a:spcBef>
-              <a:buSzTx/>
-            </a:pPr>
-            <a:r>
-              <a:rPr lang="en-US" dirty="0"/>
-              <a:t>Grading / Resubmission / Deadline Extension – Google Form</a:t>
-            </a:r>
-          </a:p>
-          <a:p>
-            <a:pPr>
-              <a:spcBef>
-                <a:spcPts val="0"/>
-              </a:spcBef>
-              <a:buSzTx/>
-            </a:pPr>
-            <a:r>
-              <a:rPr lang="en-US" dirty="0"/>
-              <a:t>Course Evaluations will be available on Friday</a:t>
-            </a:r>
-          </a:p>
-          <a:p>
-            <a:pPr>
-              <a:spcBef>
-                <a:spcPts val="0"/>
-              </a:spcBef>
-              <a:buSzTx/>
-            </a:pPr>
-            <a:r>
-              <a:rPr lang="en-US" dirty="0"/>
-              <a:t>Piazza</a:t>
-            </a:r>
+            <a:endParaRPr lang="en-US" dirty="0"/>
           </a:p>
         </p:txBody>
       </p:sp>
@@ -3141,270 +4105,221 @@
       </p:grpSpPr>
       <p:sp>
         <p:nvSpPr>
-          <p:cNvPr id="3" name="Text Placeholder 2">
+          <p:cNvPr id="4" name="TextBox 3">
             <a:extLst>
               <a:ext uri="{FF2B5EF4-FFF2-40B4-BE49-F238E27FC236}">
-                <a16:creationId xmlns:a16="http://schemas.microsoft.com/office/drawing/2014/main" id="{F27CF503-FE93-410D-8E47-DF86C3A5FED2}"/>
+                <a16:creationId xmlns:a16="http://schemas.microsoft.com/office/drawing/2014/main" id="{D019A569-23AE-45AD-9384-2FBE7FF5DD3B}"/>
               </a:ext>
             </a:extLst>
           </p:cNvPr>
-          <p:cNvSpPr>
-            <a:spLocks noGrp="1"/>
-          </p:cNvSpPr>
-          <p:nvPr>
-            <p:ph type="body" idx="1"/>
-          </p:nvPr>
+          <p:cNvSpPr txBox="1"/>
+          <p:nvPr/>
         </p:nvSpPr>
         <p:spPr>
           <a:xfrm>
-            <a:off x="952500" y="508000"/>
-            <a:ext cx="11099800" cy="8432800"/>
+            <a:off x="971550" y="4336932"/>
+            <a:ext cx="11061700" cy="595035"/>
           </a:xfrm>
+          <a:prstGeom prst="rect">
+            <a:avLst/>
+          </a:prstGeom>
+          <a:noFill/>
+          <a:ln w="12700" cap="flat">
+            <a:noFill/>
+            <a:miter lim="400000"/>
+          </a:ln>
+          <a:effectLst/>
+          <a:sp3d/>
         </p:spPr>
+        <p:style>
+          <a:lnRef idx="0">
+            <a:scrgbClr r="0" g="0" b="0"/>
+          </a:lnRef>
+          <a:fillRef idx="0">
+            <a:scrgbClr r="0" g="0" b="0"/>
+          </a:fillRef>
+          <a:effectRef idx="0">
+            <a:scrgbClr r="0" g="0" b="0"/>
+          </a:effectRef>
+          <a:fontRef idx="none"/>
+        </p:style>
         <p:txBody>
-          <a:bodyPr>
-            <a:noAutofit/>
+          <a:bodyPr rot="0" spcFirstLastPara="1" vertOverflow="overflow" horzOverflow="overflow" vert="horz" wrap="square" lIns="50800" tIns="50800" rIns="50800" bIns="50800" numCol="1" spcCol="38100" rtlCol="0" anchor="ctr">
+            <a:spAutoFit/>
           </a:bodyPr>
           <a:lstStyle/>
           <a:p>
-            <a:pPr marL="0" indent="0" algn="ctr">
-              <a:spcBef>
-                <a:spcPts val="0"/>
-              </a:spcBef>
-              <a:buNone/>
-            </a:pPr>
-            <a:r>
-              <a:rPr lang="en-US" b="1" dirty="0"/>
-              <a:t>Strategies before posting to Piazza:</a:t>
-            </a:r>
-          </a:p>
-          <a:p>
-            <a:pPr marL="514350" indent="-514350">
-              <a:spcBef>
-                <a:spcPts val="0"/>
-              </a:spcBef>
-              <a:spcAft>
-                <a:spcPts val="600"/>
-              </a:spcAft>
-              <a:buSzPct val="100000"/>
-              <a:buFont typeface="+mj-lt"/>
-              <a:buAutoNum type="arabicPeriod"/>
-            </a:pPr>
-            <a:r>
-              <a:rPr lang="en-US" sz="2800" dirty="0"/>
-              <a:t>Look for similar Piazza posts</a:t>
-            </a:r>
-          </a:p>
-          <a:p>
-            <a:pPr marL="1403350" lvl="2" indent="-514350">
-              <a:spcBef>
-                <a:spcPts val="0"/>
-              </a:spcBef>
-              <a:spcAft>
-                <a:spcPts val="600"/>
-              </a:spcAft>
-              <a:buSzPct val="100000"/>
-              <a:buFont typeface="+mj-lt"/>
-              <a:buAutoNum type="alphaLcParenR"/>
-            </a:pPr>
-            <a:r>
-              <a:rPr lang="en-US" sz="2800" dirty="0"/>
-              <a:t>Project_9 Folder </a:t>
-            </a:r>
-          </a:p>
-          <a:p>
-            <a:pPr marL="1403350" lvl="2" indent="-514350">
-              <a:spcBef>
-                <a:spcPts val="0"/>
-              </a:spcBef>
-              <a:spcAft>
-                <a:spcPts val="600"/>
-              </a:spcAft>
-              <a:buSzPct val="100000"/>
-              <a:buFont typeface="+mj-lt"/>
-              <a:buAutoNum type="alphaLcParenR"/>
-            </a:pPr>
-            <a:r>
-              <a:rPr lang="en-US" sz="2800" dirty="0"/>
-              <a:t>Title Q9 </a:t>
-            </a:r>
-          </a:p>
-          <a:p>
-            <a:pPr marL="1403350" lvl="2" indent="-514350">
-              <a:spcBef>
-                <a:spcPts val="0"/>
-              </a:spcBef>
-              <a:spcAft>
-                <a:spcPts val="600"/>
-              </a:spcAft>
-              <a:buSzPct val="100000"/>
-              <a:buFont typeface="+mj-lt"/>
-              <a:buAutoNum type="alphaLcParenR"/>
-            </a:pPr>
-            <a:r>
-              <a:rPr lang="en-US" sz="2800" dirty="0"/>
-              <a:t>Recent date</a:t>
-            </a:r>
-          </a:p>
-          <a:p>
-            <a:pPr marL="514350" indent="-514350">
-              <a:spcBef>
-                <a:spcPts val="0"/>
-              </a:spcBef>
-              <a:spcAft>
-                <a:spcPts val="600"/>
-              </a:spcAft>
-              <a:buSzPct val="100000"/>
-              <a:buFont typeface="+mj-lt"/>
-              <a:buAutoNum type="arabicPeriod"/>
-            </a:pPr>
-            <a:r>
-              <a:rPr lang="en-US" sz="2800" dirty="0"/>
-              <a:t>Add comments to your code to explain what each piece (like a loop) is supposed to be doing.</a:t>
-            </a:r>
-          </a:p>
-          <a:p>
-            <a:pPr marL="514350" indent="-514350">
-              <a:spcBef>
-                <a:spcPts val="0"/>
-              </a:spcBef>
-              <a:spcAft>
-                <a:spcPts val="600"/>
-              </a:spcAft>
-              <a:buSzPct val="100000"/>
-              <a:buFont typeface="+mj-lt"/>
-              <a:buAutoNum type="arabicPeriod"/>
-            </a:pPr>
-            <a:r>
-              <a:rPr lang="en-US" sz="2800" dirty="0"/>
-              <a:t>Explain the strategy you are trying to use.  </a:t>
-            </a:r>
-          </a:p>
-          <a:p>
-            <a:pPr marL="1403350" lvl="2" indent="-514350">
-              <a:spcBef>
-                <a:spcPts val="0"/>
-              </a:spcBef>
-              <a:spcAft>
-                <a:spcPts val="600"/>
-              </a:spcAft>
-              <a:buSzPct val="100000"/>
-              <a:buFont typeface="+mj-lt"/>
-              <a:buAutoNum type="alphaLcParenR"/>
-            </a:pPr>
-            <a:r>
-              <a:rPr lang="en-US" sz="2800" dirty="0"/>
-              <a:t>In comments!</a:t>
-            </a:r>
-          </a:p>
-          <a:p>
-            <a:pPr marL="1403350" lvl="2" indent="-514350">
-              <a:spcBef>
-                <a:spcPts val="0"/>
-              </a:spcBef>
-              <a:spcAft>
-                <a:spcPts val="600"/>
-              </a:spcAft>
-              <a:buSzPct val="100000"/>
-              <a:buFont typeface="+mj-lt"/>
-              <a:buAutoNum type="alphaLcParenR"/>
-            </a:pPr>
-            <a:r>
-              <a:rPr lang="en-US" sz="2800" dirty="0"/>
-              <a:t>Many problems can be solved with more than one technique. </a:t>
-            </a:r>
-          </a:p>
-          <a:p>
-            <a:pPr marL="514350" indent="-514350">
-              <a:spcBef>
-                <a:spcPts val="0"/>
-              </a:spcBef>
-              <a:spcAft>
-                <a:spcPts val="600"/>
-              </a:spcAft>
-              <a:buSzPct val="100000"/>
-              <a:buFont typeface="+mj-lt"/>
-              <a:buAutoNum type="arabicPeriod"/>
-            </a:pPr>
-            <a:r>
-              <a:rPr lang="en-US" sz="2800" dirty="0"/>
-              <a:t>Did you name your variables something meaningful? </a:t>
-            </a:r>
-          </a:p>
-          <a:p>
-            <a:pPr marL="1403350" lvl="2" indent="-514350">
-              <a:spcBef>
-                <a:spcPts val="0"/>
-              </a:spcBef>
-              <a:spcAft>
-                <a:spcPts val="600"/>
-              </a:spcAft>
-              <a:buSzPct val="100000"/>
-              <a:buFont typeface="+mj-lt"/>
-              <a:buAutoNum type="alphaLcParenR"/>
-            </a:pPr>
-            <a:r>
-              <a:rPr lang="en-US" sz="2800" dirty="0"/>
-              <a:t>The TAs need to be able to  figure out what data they are supposed to contain</a:t>
-            </a:r>
-          </a:p>
-          <a:p>
-            <a:pPr marL="1403350" lvl="2" indent="-514350">
-              <a:spcBef>
-                <a:spcPts val="0"/>
-              </a:spcBef>
-              <a:spcAft>
-                <a:spcPts val="600"/>
-              </a:spcAft>
-              <a:buSzPct val="100000"/>
-              <a:buFont typeface="+mj-lt"/>
-              <a:buAutoNum type="alphaLcParenR"/>
-            </a:pPr>
-            <a:r>
-              <a:rPr lang="en-US" sz="2800" dirty="0"/>
-              <a:t>Go rename them to make them clearer!</a:t>
-            </a:r>
-          </a:p>
-          <a:p>
-            <a:pPr marL="514350" indent="-514350">
-              <a:spcBef>
-                <a:spcPts val="0"/>
-              </a:spcBef>
-              <a:spcAft>
-                <a:spcPts val="600"/>
-              </a:spcAft>
-              <a:buSzPct val="100000"/>
-              <a:buFont typeface="+mj-lt"/>
-              <a:buAutoNum type="arabicPeriod"/>
-            </a:pPr>
-            <a:r>
-              <a:rPr lang="en-US" sz="2800" dirty="0"/>
-              <a:t>Add statements to print out the contents of variables and their types.</a:t>
-            </a:r>
-          </a:p>
-          <a:p>
-            <a:pPr marL="514350" indent="-514350">
-              <a:spcBef>
-                <a:spcPts val="0"/>
-              </a:spcBef>
-              <a:spcAft>
-                <a:spcPts val="600"/>
-              </a:spcAft>
-              <a:buSzPct val="100000"/>
-              <a:buFont typeface="+mj-lt"/>
-              <a:buAutoNum type="arabicPeriod"/>
-            </a:pPr>
-            <a:r>
-              <a:rPr lang="en-US" sz="2800" dirty="0"/>
-              <a:t>We need a screenshot of the error message or incorrect output.</a:t>
-            </a:r>
+            <a:r>
+              <a:rPr lang="en-US" sz="3200" b="0" dirty="0">
+                <a:latin typeface="Courier New" panose="02070309020205020404" pitchFamily="49" charset="0"/>
+                <a:cs typeface="Courier New" panose="02070309020205020404" pitchFamily="49" charset="0"/>
+              </a:rPr>
+              <a:t>trees</a:t>
+            </a:r>
+            <a:r>
+              <a:rPr lang="en-US" sz="3200" dirty="0">
+                <a:solidFill>
+                  <a:srgbClr val="00B0F0"/>
+                </a:solidFill>
+                <a:latin typeface="Courier New" panose="02070309020205020404" pitchFamily="49" charset="0"/>
+                <a:cs typeface="Courier New" panose="02070309020205020404" pitchFamily="49" charset="0"/>
+              </a:rPr>
+              <a:t>[</a:t>
+            </a:r>
+            <a:r>
+              <a:rPr lang="en-US" sz="3200" b="0" dirty="0">
+                <a:latin typeface="Courier New" panose="02070309020205020404" pitchFamily="49" charset="0"/>
+                <a:cs typeface="Courier New" panose="02070309020205020404" pitchFamily="49" charset="0"/>
+              </a:rPr>
+              <a:t>trees</a:t>
+            </a:r>
+            <a:r>
+              <a:rPr lang="en-US" sz="3200" dirty="0">
+                <a:solidFill>
+                  <a:srgbClr val="FF0000"/>
+                </a:solidFill>
+                <a:latin typeface="Courier New" panose="02070309020205020404" pitchFamily="49" charset="0"/>
+                <a:cs typeface="Courier New" panose="02070309020205020404" pitchFamily="49" charset="0"/>
+              </a:rPr>
+              <a:t>[</a:t>
+            </a:r>
+            <a:r>
+              <a:rPr lang="en-US" sz="3200" b="0" dirty="0">
+                <a:latin typeface="Courier New" panose="02070309020205020404" pitchFamily="49" charset="0"/>
+                <a:cs typeface="Courier New" panose="02070309020205020404" pitchFamily="49" charset="0"/>
+              </a:rPr>
+              <a:t>"priority"</a:t>
+            </a:r>
+            <a:r>
+              <a:rPr lang="en-US" sz="3200" dirty="0">
+                <a:solidFill>
+                  <a:srgbClr val="FF0000"/>
+                </a:solidFill>
+                <a:latin typeface="Courier New" panose="02070309020205020404" pitchFamily="49" charset="0"/>
+                <a:cs typeface="Courier New" panose="02070309020205020404" pitchFamily="49" charset="0"/>
+              </a:rPr>
+              <a:t>]</a:t>
+            </a:r>
+            <a:r>
+              <a:rPr lang="en-US" sz="3200" b="0" dirty="0">
+                <a:latin typeface="Courier New" panose="02070309020205020404" pitchFamily="49" charset="0"/>
+                <a:cs typeface="Courier New" panose="02070309020205020404" pitchFamily="49" charset="0"/>
+              </a:rPr>
+              <a:t> &gt; 90</a:t>
+            </a:r>
+            <a:r>
+              <a:rPr lang="en-US" sz="3200" dirty="0">
+                <a:solidFill>
+                  <a:srgbClr val="00B0F0"/>
+                </a:solidFill>
+                <a:latin typeface="Courier New" panose="02070309020205020404" pitchFamily="49" charset="0"/>
+                <a:cs typeface="Courier New" panose="02070309020205020404" pitchFamily="49" charset="0"/>
+              </a:rPr>
+              <a:t>] </a:t>
+            </a:r>
+            <a:r>
+              <a:rPr lang="en-US" sz="3200" dirty="0">
+                <a:solidFill>
+                  <a:srgbClr val="7030A0"/>
+                </a:solidFill>
+                <a:latin typeface="Courier New" panose="02070309020205020404" pitchFamily="49" charset="0"/>
+                <a:cs typeface="Courier New" panose="02070309020205020404" pitchFamily="49" charset="0"/>
+              </a:rPr>
+              <a:t>[</a:t>
+            </a:r>
+            <a:r>
+              <a:rPr lang="en-US" sz="3200" dirty="0">
+                <a:solidFill>
+                  <a:srgbClr val="00B050"/>
+                </a:solidFill>
+                <a:latin typeface="Courier New" panose="02070309020205020404" pitchFamily="49" charset="0"/>
+                <a:cs typeface="Courier New" panose="02070309020205020404" pitchFamily="49" charset="0"/>
+              </a:rPr>
+              <a:t>[</a:t>
+            </a:r>
+            <a:r>
+              <a:rPr lang="en-US" sz="3200" b="0" dirty="0">
+                <a:latin typeface="Courier New" panose="02070309020205020404" pitchFamily="49" charset="0"/>
+                <a:cs typeface="Courier New" panose="02070309020205020404" pitchFamily="49" charset="0"/>
+              </a:rPr>
+              <a:t>"x", "y"</a:t>
+            </a:r>
+            <a:r>
+              <a:rPr lang="en-US" sz="3200" dirty="0">
+                <a:solidFill>
+                  <a:srgbClr val="00B050"/>
+                </a:solidFill>
+                <a:latin typeface="Courier New" panose="02070309020205020404" pitchFamily="49" charset="0"/>
+                <a:cs typeface="Courier New" panose="02070309020205020404" pitchFamily="49" charset="0"/>
+              </a:rPr>
+              <a:t>]</a:t>
+            </a:r>
+            <a:r>
+              <a:rPr lang="en-US" sz="3200" dirty="0">
+                <a:solidFill>
+                  <a:srgbClr val="7030A0"/>
+                </a:solidFill>
+                <a:latin typeface="Courier New" panose="02070309020205020404" pitchFamily="49" charset="0"/>
+                <a:cs typeface="Courier New" panose="02070309020205020404" pitchFamily="49" charset="0"/>
+              </a:rPr>
+              <a:t>]</a:t>
+            </a:r>
+            <a:r>
+              <a:rPr lang="en-US" sz="3200" b="0" dirty="0">
+                <a:latin typeface="Courier New" panose="02070309020205020404" pitchFamily="49" charset="0"/>
+                <a:cs typeface="Courier New" panose="02070309020205020404" pitchFamily="49" charset="0"/>
+              </a:rPr>
+              <a:t> </a:t>
+            </a:r>
+            <a:endParaRPr kumimoji="0" lang="en-US" sz="3200" b="0" i="0" u="none" strike="noStrike" cap="none" spc="0" normalizeH="0" baseline="0" dirty="0">
+              <a:ln>
+                <a:noFill/>
+              </a:ln>
+              <a:solidFill>
+                <a:srgbClr val="000000"/>
+              </a:solidFill>
+              <a:effectLst/>
+              <a:uFillTx/>
+              <a:latin typeface="Courier New" panose="02070309020205020404" pitchFamily="49" charset="0"/>
+              <a:cs typeface="Courier New" panose="02070309020205020404" pitchFamily="49" charset="0"/>
+              <a:sym typeface="Gill Sans"/>
+            </a:endParaRPr>
           </a:p>
         </p:txBody>
       </p:sp>
+      <p:pic>
+        <p:nvPicPr>
+          <p:cNvPr id="6" name="Picture 5">
+            <a:extLst>
+              <a:ext uri="{FF2B5EF4-FFF2-40B4-BE49-F238E27FC236}">
+                <a16:creationId xmlns:a16="http://schemas.microsoft.com/office/drawing/2014/main" id="{851715FA-A71D-467E-B8DD-289CFCAA666F}"/>
+              </a:ext>
+            </a:extLst>
+          </p:cNvPr>
+          <p:cNvPicPr>
+            <a:picLocks noChangeAspect="1"/>
+          </p:cNvPicPr>
+          <p:nvPr/>
+        </p:nvPicPr>
+        <p:blipFill rotWithShape="1">
+          <a:blip r:embed="rId2"/>
+          <a:srcRect t="21092" r="46289" b="33119"/>
+          <a:stretch/>
+        </p:blipFill>
+        <p:spPr>
+          <a:xfrm>
+            <a:off x="1473200" y="0"/>
+            <a:ext cx="9021912" cy="4326334"/>
+          </a:xfrm>
+          <a:prstGeom prst="rect">
+            <a:avLst/>
+          </a:prstGeom>
+        </p:spPr>
+      </p:pic>
     </p:spTree>
     <p:extLst>
       <p:ext uri="{BB962C8B-B14F-4D97-AF65-F5344CB8AC3E}">
-        <p14:creationId xmlns:p14="http://schemas.microsoft.com/office/powerpoint/2010/main" val="4094911588"/>
+        <p14:creationId xmlns:p14="http://schemas.microsoft.com/office/powerpoint/2010/main" val="2251941406"/>
       </p:ext>
     </p:extLst>
   </p:cSld>
@@ -3434,115 +4349,296 @@
       </p:grpSpPr>
       <p:sp>
         <p:nvSpPr>
-          <p:cNvPr id="2" name="Title 1">
+          <p:cNvPr id="4" name="TextBox 3">
             <a:extLst>
               <a:ext uri="{FF2B5EF4-FFF2-40B4-BE49-F238E27FC236}">
-                <a16:creationId xmlns:a16="http://schemas.microsoft.com/office/drawing/2014/main" id="{29128785-1A9E-432C-B375-F49E5D303C10}"/>
+                <a16:creationId xmlns:a16="http://schemas.microsoft.com/office/drawing/2014/main" id="{D019A569-23AE-45AD-9384-2FBE7FF5DD3B}"/>
               </a:ext>
             </a:extLst>
           </p:cNvPr>
-          <p:cNvSpPr>
-            <a:spLocks noGrp="1"/>
-          </p:cNvSpPr>
-          <p:nvPr>
-            <p:ph type="title"/>
-          </p:nvPr>
+          <p:cNvSpPr txBox="1"/>
+          <p:nvPr/>
         </p:nvSpPr>
-        <p:spPr/>
+        <p:spPr>
+          <a:xfrm>
+            <a:off x="971550" y="4336932"/>
+            <a:ext cx="11061700" cy="595035"/>
+          </a:xfrm>
+          <a:prstGeom prst="rect">
+            <a:avLst/>
+          </a:prstGeom>
+          <a:noFill/>
+          <a:ln w="12700" cap="flat">
+            <a:noFill/>
+            <a:miter lim="400000"/>
+          </a:ln>
+          <a:effectLst/>
+          <a:sp3d/>
+        </p:spPr>
+        <p:style>
+          <a:lnRef idx="0">
+            <a:scrgbClr r="0" g="0" b="0"/>
+          </a:lnRef>
+          <a:fillRef idx="0">
+            <a:scrgbClr r="0" g="0" b="0"/>
+          </a:fillRef>
+          <a:effectRef idx="0">
+            <a:scrgbClr r="0" g="0" b="0"/>
+          </a:effectRef>
+          <a:fontRef idx="none"/>
+        </p:style>
         <p:txBody>
-          <a:bodyPr/>
+          <a:bodyPr rot="0" spcFirstLastPara="1" vertOverflow="overflow" horzOverflow="overflow" vert="horz" wrap="square" lIns="50800" tIns="50800" rIns="50800" bIns="50800" numCol="1" spcCol="38100" rtlCol="0" anchor="ctr">
+            <a:spAutoFit/>
+          </a:bodyPr>
           <a:lstStyle/>
           <a:p>
             <a:r>
-              <a:rPr lang="en-US" dirty="0"/>
-              <a:t>SQL</a:t>
-            </a:r>
+              <a:rPr lang="en-US" sz="3200" b="0" dirty="0">
+                <a:latin typeface="Courier New" panose="02070309020205020404" pitchFamily="49" charset="0"/>
+                <a:cs typeface="Courier New" panose="02070309020205020404" pitchFamily="49" charset="0"/>
+              </a:rPr>
+              <a:t>trees</a:t>
+            </a:r>
+            <a:r>
+              <a:rPr lang="en-US" sz="3200" dirty="0">
+                <a:solidFill>
+                  <a:srgbClr val="00B0F0"/>
+                </a:solidFill>
+                <a:latin typeface="Courier New" panose="02070309020205020404" pitchFamily="49" charset="0"/>
+                <a:cs typeface="Courier New" panose="02070309020205020404" pitchFamily="49" charset="0"/>
+              </a:rPr>
+              <a:t>[</a:t>
+            </a:r>
+            <a:r>
+              <a:rPr lang="en-US" sz="3200" b="0" dirty="0">
+                <a:latin typeface="Courier New" panose="02070309020205020404" pitchFamily="49" charset="0"/>
+                <a:cs typeface="Courier New" panose="02070309020205020404" pitchFamily="49" charset="0"/>
+              </a:rPr>
+              <a:t>trees</a:t>
+            </a:r>
+            <a:r>
+              <a:rPr lang="en-US" sz="3200" dirty="0">
+                <a:solidFill>
+                  <a:srgbClr val="FF0000"/>
+                </a:solidFill>
+                <a:latin typeface="Courier New" panose="02070309020205020404" pitchFamily="49" charset="0"/>
+                <a:cs typeface="Courier New" panose="02070309020205020404" pitchFamily="49" charset="0"/>
+              </a:rPr>
+              <a:t>[</a:t>
+            </a:r>
+            <a:r>
+              <a:rPr lang="en-US" sz="3200" b="0" dirty="0">
+                <a:latin typeface="Courier New" panose="02070309020205020404" pitchFamily="49" charset="0"/>
+                <a:cs typeface="Courier New" panose="02070309020205020404" pitchFamily="49" charset="0"/>
+              </a:rPr>
+              <a:t>"priority"</a:t>
+            </a:r>
+            <a:r>
+              <a:rPr lang="en-US" sz="3200" dirty="0">
+                <a:solidFill>
+                  <a:srgbClr val="FF0000"/>
+                </a:solidFill>
+                <a:latin typeface="Courier New" panose="02070309020205020404" pitchFamily="49" charset="0"/>
+                <a:cs typeface="Courier New" panose="02070309020205020404" pitchFamily="49" charset="0"/>
+              </a:rPr>
+              <a:t>]</a:t>
+            </a:r>
+            <a:r>
+              <a:rPr lang="en-US" sz="3200" b="0" dirty="0">
+                <a:latin typeface="Courier New" panose="02070309020205020404" pitchFamily="49" charset="0"/>
+                <a:cs typeface="Courier New" panose="02070309020205020404" pitchFamily="49" charset="0"/>
+              </a:rPr>
+              <a:t> &gt; 90</a:t>
+            </a:r>
+            <a:r>
+              <a:rPr lang="en-US" sz="3200" dirty="0">
+                <a:solidFill>
+                  <a:srgbClr val="00B0F0"/>
+                </a:solidFill>
+                <a:latin typeface="Courier New" panose="02070309020205020404" pitchFamily="49" charset="0"/>
+                <a:cs typeface="Courier New" panose="02070309020205020404" pitchFamily="49" charset="0"/>
+              </a:rPr>
+              <a:t>] </a:t>
+            </a:r>
+            <a:r>
+              <a:rPr lang="en-US" sz="3200" dirty="0">
+                <a:solidFill>
+                  <a:srgbClr val="7030A0"/>
+                </a:solidFill>
+                <a:latin typeface="Courier New" panose="02070309020205020404" pitchFamily="49" charset="0"/>
+                <a:cs typeface="Courier New" panose="02070309020205020404" pitchFamily="49" charset="0"/>
+              </a:rPr>
+              <a:t>[</a:t>
+            </a:r>
+            <a:r>
+              <a:rPr lang="en-US" sz="3200" dirty="0">
+                <a:solidFill>
+                  <a:srgbClr val="00B050"/>
+                </a:solidFill>
+                <a:latin typeface="Courier New" panose="02070309020205020404" pitchFamily="49" charset="0"/>
+                <a:cs typeface="Courier New" panose="02070309020205020404" pitchFamily="49" charset="0"/>
+              </a:rPr>
+              <a:t>[</a:t>
+            </a:r>
+            <a:r>
+              <a:rPr lang="en-US" sz="3200" b="0" dirty="0">
+                <a:latin typeface="Courier New" panose="02070309020205020404" pitchFamily="49" charset="0"/>
+                <a:cs typeface="Courier New" panose="02070309020205020404" pitchFamily="49" charset="0"/>
+              </a:rPr>
+              <a:t>"x", "y"</a:t>
+            </a:r>
+            <a:r>
+              <a:rPr lang="en-US" sz="3200" dirty="0">
+                <a:solidFill>
+                  <a:srgbClr val="00B050"/>
+                </a:solidFill>
+                <a:latin typeface="Courier New" panose="02070309020205020404" pitchFamily="49" charset="0"/>
+                <a:cs typeface="Courier New" panose="02070309020205020404" pitchFamily="49" charset="0"/>
+              </a:rPr>
+              <a:t>]</a:t>
+            </a:r>
+            <a:r>
+              <a:rPr lang="en-US" sz="3200" dirty="0">
+                <a:solidFill>
+                  <a:srgbClr val="7030A0"/>
+                </a:solidFill>
+                <a:latin typeface="Courier New" panose="02070309020205020404" pitchFamily="49" charset="0"/>
+                <a:cs typeface="Courier New" panose="02070309020205020404" pitchFamily="49" charset="0"/>
+              </a:rPr>
+              <a:t>]</a:t>
+            </a:r>
+            <a:r>
+              <a:rPr lang="en-US" sz="3200" b="0" dirty="0">
+                <a:latin typeface="Courier New" panose="02070309020205020404" pitchFamily="49" charset="0"/>
+                <a:cs typeface="Courier New" panose="02070309020205020404" pitchFamily="49" charset="0"/>
+              </a:rPr>
+              <a:t> </a:t>
+            </a:r>
+            <a:endParaRPr kumimoji="0" lang="en-US" sz="3200" b="0" i="0" u="none" strike="noStrike" cap="none" spc="0" normalizeH="0" baseline="0" dirty="0">
+              <a:ln>
+                <a:noFill/>
+              </a:ln>
+              <a:solidFill>
+                <a:srgbClr val="000000"/>
+              </a:solidFill>
+              <a:effectLst/>
+              <a:uFillTx/>
+              <a:latin typeface="Courier New" panose="02070309020205020404" pitchFamily="49" charset="0"/>
+              <a:cs typeface="Courier New" panose="02070309020205020404" pitchFamily="49" charset="0"/>
+              <a:sym typeface="Gill Sans"/>
+            </a:endParaRPr>
           </a:p>
         </p:txBody>
       </p:sp>
       <p:sp>
         <p:nvSpPr>
-          <p:cNvPr id="3" name="Text Placeholder 2">
+          <p:cNvPr id="5" name="Right Brace 4">
             <a:extLst>
               <a:ext uri="{FF2B5EF4-FFF2-40B4-BE49-F238E27FC236}">
-                <a16:creationId xmlns:a16="http://schemas.microsoft.com/office/drawing/2014/main" id="{1B3AF792-85F2-4902-8DEE-FD7847AEF232}"/>
+                <a16:creationId xmlns:a16="http://schemas.microsoft.com/office/drawing/2014/main" id="{2D6A4E87-43FF-4D2A-BA0E-C24E07DCB8FD}"/>
               </a:ext>
             </a:extLst>
           </p:cNvPr>
-          <p:cNvSpPr>
-            <a:spLocks noGrp="1"/>
-          </p:cNvSpPr>
-          <p:nvPr>
-            <p:ph type="body" idx="1"/>
-          </p:nvPr>
+          <p:cNvSpPr/>
+          <p:nvPr/>
         </p:nvSpPr>
         <p:spPr>
-          <a:xfrm>
-            <a:off x="1905000" y="2552700"/>
-            <a:ext cx="11099800" cy="6286500"/>
+          <a:xfrm rot="5400000">
+            <a:off x="5318124" y="3881042"/>
+            <a:ext cx="495300" cy="2597150"/>
           </a:xfrm>
+          <a:prstGeom prst="rightBrace">
+            <a:avLst/>
+          </a:prstGeom>
+          <a:ln w="38100">
+            <a:solidFill>
+              <a:srgbClr val="FF0000"/>
+            </a:solidFill>
+          </a:ln>
         </p:spPr>
+        <p:style>
+          <a:lnRef idx="1">
+            <a:schemeClr val="accent5"/>
+          </a:lnRef>
+          <a:fillRef idx="0">
+            <a:schemeClr val="accent5"/>
+          </a:fillRef>
+          <a:effectRef idx="0">
+            <a:schemeClr val="accent5"/>
+          </a:effectRef>
+          <a:fontRef idx="minor">
+            <a:schemeClr val="tx1"/>
+          </a:fontRef>
+        </p:style>
         <p:txBody>
-          <a:bodyPr/>
+          <a:bodyPr rot="0" spcFirstLastPara="1" vertOverflow="overflow" horzOverflow="overflow" vert="horz" wrap="square" lIns="91439" tIns="45719" rIns="91439" bIns="45719" numCol="1" spcCol="38100" rtlCol="0" anchor="t">
+            <a:noAutofit/>
+          </a:bodyPr>
           <a:lstStyle/>
           <a:p>
-            <a:pPr marL="0" indent="0">
+            <a:pPr marL="0" marR="0" indent="0" algn="l" defTabSz="914400" rtl="0" fontAlgn="auto" latinLnBrk="1" hangingPunct="0">
+              <a:lnSpc>
+                <a:spcPct val="100000"/>
+              </a:lnSpc>
+              <a:spcBef>
+                <a:spcPts val="0"/>
+              </a:spcBef>
+              <a:spcAft>
+                <a:spcPts val="0"/>
+              </a:spcAft>
+              <a:buClrTx/>
+              <a:buSzTx/>
+              <a:buFontTx/>
               <a:buNone/>
+              <a:tabLst/>
             </a:pPr>
-            <a:r>
-              <a:rPr lang="en-US" dirty="0" err="1"/>
-              <a:t>pd.read_sql</a:t>
-            </a:r>
-            <a:r>
-              <a:rPr lang="en-US" dirty="0"/>
-              <a:t>(“</a:t>
-            </a:r>
-            <a:r>
-              <a:rPr lang="en-US" dirty="0">
-                <a:solidFill>
-                  <a:srgbClr val="FF0000"/>
-                </a:solidFill>
-              </a:rPr>
-              <a:t>QUERRY</a:t>
-            </a:r>
-            <a:r>
-              <a:rPr lang="en-US" dirty="0"/>
-              <a:t>”, CONNECTION)</a:t>
-            </a:r>
-          </a:p>
-          <a:p>
-            <a:r>
-              <a:rPr lang="en-US" dirty="0"/>
-              <a:t>SELECT</a:t>
-            </a:r>
-          </a:p>
-          <a:p>
-            <a:r>
-              <a:rPr lang="en-US" dirty="0"/>
-              <a:t>FROM</a:t>
-            </a:r>
-          </a:p>
-          <a:p>
-            <a:r>
-              <a:rPr lang="en-US" dirty="0"/>
-              <a:t>WHERE</a:t>
-            </a:r>
-          </a:p>
-          <a:p>
-            <a:r>
-              <a:rPr lang="en-US" dirty="0"/>
-              <a:t>LIMIT</a:t>
-            </a:r>
-          </a:p>
-          <a:p>
-            <a:endParaRPr lang="en-US" dirty="0"/>
+            <a:endParaRPr kumimoji="0" lang="en-US" sz="1800" i="0" u="none" strike="noStrike" cap="none" spc="0" normalizeH="0" baseline="0" dirty="0">
+              <a:ln>
+                <a:noFill/>
+              </a:ln>
+              <a:solidFill>
+                <a:srgbClr val="000000"/>
+              </a:solidFill>
+              <a:effectLst/>
+              <a:uFillTx/>
+            </a:endParaRPr>
           </a:p>
         </p:txBody>
       </p:sp>
+      <p:pic>
+        <p:nvPicPr>
+          <p:cNvPr id="6" name="Picture 5">
+            <a:extLst>
+              <a:ext uri="{FF2B5EF4-FFF2-40B4-BE49-F238E27FC236}">
+                <a16:creationId xmlns:a16="http://schemas.microsoft.com/office/drawing/2014/main" id="{851715FA-A71D-467E-B8DD-289CFCAA666F}"/>
+              </a:ext>
+            </a:extLst>
+          </p:cNvPr>
+          <p:cNvPicPr>
+            <a:picLocks noChangeAspect="1"/>
+          </p:cNvPicPr>
+          <p:nvPr/>
+        </p:nvPicPr>
+        <p:blipFill rotWithShape="1">
+          <a:blip r:embed="rId2"/>
+          <a:srcRect t="21092" r="46289" b="33119"/>
+          <a:stretch/>
+        </p:blipFill>
+        <p:spPr>
+          <a:xfrm>
+            <a:off x="1473200" y="0"/>
+            <a:ext cx="9021912" cy="4326334"/>
+          </a:xfrm>
+          <a:prstGeom prst="rect">
+            <a:avLst/>
+          </a:prstGeom>
+        </p:spPr>
+      </p:pic>
     </p:spTree>
     <p:extLst>
       <p:ext uri="{BB962C8B-B14F-4D97-AF65-F5344CB8AC3E}">
-        <p14:creationId xmlns:p14="http://schemas.microsoft.com/office/powerpoint/2010/main" val="2803743491"/>
+        <p14:creationId xmlns:p14="http://schemas.microsoft.com/office/powerpoint/2010/main" val="2759154991"/>
       </p:ext>
     </p:extLst>
   </p:cSld>
@@ -3572,99 +4668,325 @@
       </p:grpSpPr>
       <p:sp>
         <p:nvSpPr>
-          <p:cNvPr id="2" name="Title 1">
+          <p:cNvPr id="4" name="TextBox 3">
             <a:extLst>
               <a:ext uri="{FF2B5EF4-FFF2-40B4-BE49-F238E27FC236}">
-                <a16:creationId xmlns:a16="http://schemas.microsoft.com/office/drawing/2014/main" id="{29128785-1A9E-432C-B375-F49E5D303C10}"/>
+                <a16:creationId xmlns:a16="http://schemas.microsoft.com/office/drawing/2014/main" id="{D019A569-23AE-45AD-9384-2FBE7FF5DD3B}"/>
               </a:ext>
             </a:extLst>
           </p:cNvPr>
-          <p:cNvSpPr>
-            <a:spLocks noGrp="1"/>
-          </p:cNvSpPr>
-          <p:nvPr>
-            <p:ph type="title"/>
-          </p:nvPr>
+          <p:cNvSpPr txBox="1"/>
+          <p:nvPr/>
         </p:nvSpPr>
-        <p:spPr/>
+        <p:spPr>
+          <a:xfrm>
+            <a:off x="971550" y="4336932"/>
+            <a:ext cx="11061700" cy="595035"/>
+          </a:xfrm>
+          <a:prstGeom prst="rect">
+            <a:avLst/>
+          </a:prstGeom>
+          <a:noFill/>
+          <a:ln w="12700" cap="flat">
+            <a:noFill/>
+            <a:miter lim="400000"/>
+          </a:ln>
+          <a:effectLst/>
+          <a:sp3d/>
+        </p:spPr>
+        <p:style>
+          <a:lnRef idx="0">
+            <a:scrgbClr r="0" g="0" b="0"/>
+          </a:lnRef>
+          <a:fillRef idx="0">
+            <a:scrgbClr r="0" g="0" b="0"/>
+          </a:fillRef>
+          <a:effectRef idx="0">
+            <a:scrgbClr r="0" g="0" b="0"/>
+          </a:effectRef>
+          <a:fontRef idx="none"/>
+        </p:style>
         <p:txBody>
-          <a:bodyPr/>
+          <a:bodyPr rot="0" spcFirstLastPara="1" vertOverflow="overflow" horzOverflow="overflow" vert="horz" wrap="square" lIns="50800" tIns="50800" rIns="50800" bIns="50800" numCol="1" spcCol="38100" rtlCol="0" anchor="ctr">
+            <a:spAutoFit/>
+          </a:bodyPr>
           <a:lstStyle/>
           <a:p>
             <a:r>
-              <a:rPr lang="en-US" dirty="0"/>
-              <a:t>SQL</a:t>
-            </a:r>
+              <a:rPr lang="en-US" sz="3200" b="0" dirty="0">
+                <a:latin typeface="Courier New" panose="02070309020205020404" pitchFamily="49" charset="0"/>
+                <a:cs typeface="Courier New" panose="02070309020205020404" pitchFamily="49" charset="0"/>
+              </a:rPr>
+              <a:t>trees</a:t>
+            </a:r>
+            <a:r>
+              <a:rPr lang="en-US" sz="3200" dirty="0">
+                <a:solidFill>
+                  <a:srgbClr val="00B0F0"/>
+                </a:solidFill>
+                <a:latin typeface="Courier New" panose="02070309020205020404" pitchFamily="49" charset="0"/>
+                <a:cs typeface="Courier New" panose="02070309020205020404" pitchFamily="49" charset="0"/>
+              </a:rPr>
+              <a:t>[</a:t>
+            </a:r>
+            <a:r>
+              <a:rPr lang="en-US" sz="3200" b="0" dirty="0">
+                <a:latin typeface="Courier New" panose="02070309020205020404" pitchFamily="49" charset="0"/>
+                <a:cs typeface="Courier New" panose="02070309020205020404" pitchFamily="49" charset="0"/>
+              </a:rPr>
+              <a:t>trees</a:t>
+            </a:r>
+            <a:r>
+              <a:rPr lang="en-US" sz="3200" dirty="0">
+                <a:solidFill>
+                  <a:srgbClr val="FF0000"/>
+                </a:solidFill>
+                <a:latin typeface="Courier New" panose="02070309020205020404" pitchFamily="49" charset="0"/>
+                <a:cs typeface="Courier New" panose="02070309020205020404" pitchFamily="49" charset="0"/>
+              </a:rPr>
+              <a:t>[</a:t>
+            </a:r>
+            <a:r>
+              <a:rPr lang="en-US" sz="3200" b="0" dirty="0">
+                <a:latin typeface="Courier New" panose="02070309020205020404" pitchFamily="49" charset="0"/>
+                <a:cs typeface="Courier New" panose="02070309020205020404" pitchFamily="49" charset="0"/>
+              </a:rPr>
+              <a:t>"priority"</a:t>
+            </a:r>
+            <a:r>
+              <a:rPr lang="en-US" sz="3200" dirty="0">
+                <a:solidFill>
+                  <a:srgbClr val="FF0000"/>
+                </a:solidFill>
+                <a:latin typeface="Courier New" panose="02070309020205020404" pitchFamily="49" charset="0"/>
+                <a:cs typeface="Courier New" panose="02070309020205020404" pitchFamily="49" charset="0"/>
+              </a:rPr>
+              <a:t>]</a:t>
+            </a:r>
+            <a:r>
+              <a:rPr lang="en-US" sz="3200" b="0" dirty="0">
+                <a:latin typeface="Courier New" panose="02070309020205020404" pitchFamily="49" charset="0"/>
+                <a:cs typeface="Courier New" panose="02070309020205020404" pitchFamily="49" charset="0"/>
+              </a:rPr>
+              <a:t> &gt; 90</a:t>
+            </a:r>
+            <a:r>
+              <a:rPr lang="en-US" sz="3200" dirty="0">
+                <a:solidFill>
+                  <a:srgbClr val="00B0F0"/>
+                </a:solidFill>
+                <a:latin typeface="Courier New" panose="02070309020205020404" pitchFamily="49" charset="0"/>
+                <a:cs typeface="Courier New" panose="02070309020205020404" pitchFamily="49" charset="0"/>
+              </a:rPr>
+              <a:t>]</a:t>
+            </a:r>
+            <a:r>
+              <a:rPr lang="en-US" sz="3200" dirty="0">
+                <a:solidFill>
+                  <a:srgbClr val="7030A0"/>
+                </a:solidFill>
+                <a:latin typeface="Courier New" panose="02070309020205020404" pitchFamily="49" charset="0"/>
+                <a:cs typeface="Courier New" panose="02070309020205020404" pitchFamily="49" charset="0"/>
+              </a:rPr>
+              <a:t>[</a:t>
+            </a:r>
+            <a:r>
+              <a:rPr lang="en-US" sz="3200" dirty="0">
+                <a:solidFill>
+                  <a:srgbClr val="00B050"/>
+                </a:solidFill>
+                <a:latin typeface="Courier New" panose="02070309020205020404" pitchFamily="49" charset="0"/>
+                <a:cs typeface="Courier New" panose="02070309020205020404" pitchFamily="49" charset="0"/>
+              </a:rPr>
+              <a:t>[</a:t>
+            </a:r>
+            <a:r>
+              <a:rPr lang="en-US" sz="3200" b="0" dirty="0">
+                <a:latin typeface="Courier New" panose="02070309020205020404" pitchFamily="49" charset="0"/>
+                <a:cs typeface="Courier New" panose="02070309020205020404" pitchFamily="49" charset="0"/>
+              </a:rPr>
+              <a:t>"x", "y"</a:t>
+            </a:r>
+            <a:r>
+              <a:rPr lang="en-US" sz="3200" dirty="0">
+                <a:solidFill>
+                  <a:srgbClr val="00B050"/>
+                </a:solidFill>
+                <a:latin typeface="Courier New" panose="02070309020205020404" pitchFamily="49" charset="0"/>
+                <a:cs typeface="Courier New" panose="02070309020205020404" pitchFamily="49" charset="0"/>
+              </a:rPr>
+              <a:t>]</a:t>
+            </a:r>
+            <a:r>
+              <a:rPr lang="en-US" sz="3200" dirty="0">
+                <a:solidFill>
+                  <a:srgbClr val="7030A0"/>
+                </a:solidFill>
+                <a:latin typeface="Courier New" panose="02070309020205020404" pitchFamily="49" charset="0"/>
+                <a:cs typeface="Courier New" panose="02070309020205020404" pitchFamily="49" charset="0"/>
+              </a:rPr>
+              <a:t>]</a:t>
+            </a:r>
+            <a:r>
+              <a:rPr lang="en-US" sz="3200" b="0" dirty="0">
+                <a:latin typeface="Courier New" panose="02070309020205020404" pitchFamily="49" charset="0"/>
+                <a:cs typeface="Courier New" panose="02070309020205020404" pitchFamily="49" charset="0"/>
+              </a:rPr>
+              <a:t> </a:t>
+            </a:r>
+            <a:endParaRPr kumimoji="0" lang="en-US" sz="3200" b="0" i="0" u="none" strike="noStrike" cap="none" spc="0" normalizeH="0" baseline="0" dirty="0">
+              <a:ln>
+                <a:noFill/>
+              </a:ln>
+              <a:solidFill>
+                <a:srgbClr val="000000"/>
+              </a:solidFill>
+              <a:effectLst/>
+              <a:uFillTx/>
+              <a:latin typeface="Courier New" panose="02070309020205020404" pitchFamily="49" charset="0"/>
+              <a:cs typeface="Courier New" panose="02070309020205020404" pitchFamily="49" charset="0"/>
+              <a:sym typeface="Gill Sans"/>
+            </a:endParaRPr>
           </a:p>
         </p:txBody>
       </p:sp>
       <p:sp>
         <p:nvSpPr>
-          <p:cNvPr id="3" name="Text Placeholder 2">
+          <p:cNvPr id="5" name="Right Brace 4">
             <a:extLst>
               <a:ext uri="{FF2B5EF4-FFF2-40B4-BE49-F238E27FC236}">
-                <a16:creationId xmlns:a16="http://schemas.microsoft.com/office/drawing/2014/main" id="{1B3AF792-85F2-4902-8DEE-FD7847AEF232}"/>
+                <a16:creationId xmlns:a16="http://schemas.microsoft.com/office/drawing/2014/main" id="{2D6A4E87-43FF-4D2A-BA0E-C24E07DCB8FD}"/>
               </a:ext>
             </a:extLst>
           </p:cNvPr>
-          <p:cNvSpPr>
-            <a:spLocks noGrp="1"/>
-          </p:cNvSpPr>
-          <p:nvPr>
-            <p:ph type="body" idx="1"/>
-          </p:nvPr>
+          <p:cNvSpPr/>
+          <p:nvPr/>
         </p:nvSpPr>
         <p:spPr>
-          <a:xfrm>
-            <a:off x="1905000" y="2552700"/>
-            <a:ext cx="11099800" cy="6286500"/>
+          <a:xfrm rot="5400000">
+            <a:off x="5419724" y="3881042"/>
+            <a:ext cx="495300" cy="2597150"/>
           </a:xfrm>
+          <a:prstGeom prst="rightBrace">
+            <a:avLst/>
+          </a:prstGeom>
+          <a:ln w="38100">
+            <a:solidFill>
+              <a:srgbClr val="FF0000"/>
+            </a:solidFill>
+          </a:ln>
         </p:spPr>
+        <p:style>
+          <a:lnRef idx="1">
+            <a:schemeClr val="accent5"/>
+          </a:lnRef>
+          <a:fillRef idx="0">
+            <a:schemeClr val="accent5"/>
+          </a:fillRef>
+          <a:effectRef idx="0">
+            <a:schemeClr val="accent5"/>
+          </a:effectRef>
+          <a:fontRef idx="minor">
+            <a:schemeClr val="tx1"/>
+          </a:fontRef>
+        </p:style>
         <p:txBody>
-          <a:bodyPr/>
+          <a:bodyPr rot="0" spcFirstLastPara="1" vertOverflow="overflow" horzOverflow="overflow" vert="horz" wrap="square" lIns="91439" tIns="45719" rIns="91439" bIns="45719" numCol="1" spcCol="38100" rtlCol="0" anchor="t">
+            <a:noAutofit/>
+          </a:bodyPr>
           <a:lstStyle/>
           <a:p>
-            <a:pPr marL="0" indent="0">
+            <a:pPr marL="0" marR="0" indent="0" algn="l" defTabSz="914400" rtl="0" fontAlgn="auto" latinLnBrk="1" hangingPunct="0">
+              <a:lnSpc>
+                <a:spcPct val="100000"/>
+              </a:lnSpc>
+              <a:spcBef>
+                <a:spcPts val="0"/>
+              </a:spcBef>
+              <a:spcAft>
+                <a:spcPts val="0"/>
+              </a:spcAft>
+              <a:buClrTx/>
+              <a:buSzTx/>
+              <a:buFontTx/>
               <a:buNone/>
+              <a:tabLst/>
             </a:pPr>
-            <a:r>
-              <a:rPr lang="en-US" dirty="0"/>
-              <a:t>Narrowing Down</a:t>
-            </a:r>
-          </a:p>
-          <a:p>
-            <a:r>
-              <a:rPr lang="en-US" dirty="0"/>
-              <a:t>SELECT - columns</a:t>
-            </a:r>
-          </a:p>
-          <a:p>
-            <a:r>
-              <a:rPr lang="en-US" dirty="0"/>
-              <a:t>FROM - table</a:t>
-            </a:r>
-          </a:p>
-          <a:p>
-            <a:r>
-              <a:rPr lang="en-US" dirty="0"/>
-              <a:t>WHERE - rows</a:t>
-            </a:r>
-          </a:p>
-          <a:p>
-            <a:r>
-              <a:rPr lang="en-US" dirty="0"/>
-              <a:t>LIMIT - rows</a:t>
-            </a:r>
-          </a:p>
-          <a:p>
-            <a:endParaRPr lang="en-US" dirty="0"/>
+            <a:endParaRPr kumimoji="0" lang="en-US" sz="1800" i="0" u="none" strike="noStrike" cap="none" spc="0" normalizeH="0" baseline="0" dirty="0">
+              <a:ln>
+                <a:noFill/>
+              </a:ln>
+              <a:solidFill>
+                <a:srgbClr val="000000"/>
+              </a:solidFill>
+              <a:effectLst/>
+              <a:uFillTx/>
+            </a:endParaRPr>
           </a:p>
         </p:txBody>
       </p:sp>
+      <p:pic>
+        <p:nvPicPr>
+          <p:cNvPr id="6" name="Picture 5">
+            <a:extLst>
+              <a:ext uri="{FF2B5EF4-FFF2-40B4-BE49-F238E27FC236}">
+                <a16:creationId xmlns:a16="http://schemas.microsoft.com/office/drawing/2014/main" id="{851715FA-A71D-467E-B8DD-289CFCAA666F}"/>
+              </a:ext>
+            </a:extLst>
+          </p:cNvPr>
+          <p:cNvPicPr>
+            <a:picLocks noChangeAspect="1"/>
+          </p:cNvPicPr>
+          <p:nvPr/>
+        </p:nvPicPr>
+        <p:blipFill rotWithShape="1">
+          <a:blip r:embed="rId2"/>
+          <a:srcRect t="21092" r="46289" b="33119"/>
+          <a:stretch/>
+        </p:blipFill>
+        <p:spPr>
+          <a:xfrm>
+            <a:off x="1473200" y="0"/>
+            <a:ext cx="9021912" cy="4326334"/>
+          </a:xfrm>
+          <a:prstGeom prst="rect">
+            <a:avLst/>
+          </a:prstGeom>
+        </p:spPr>
+      </p:pic>
+      <p:pic>
+        <p:nvPicPr>
+          <p:cNvPr id="7" name="Picture 6">
+            <a:extLst>
+              <a:ext uri="{FF2B5EF4-FFF2-40B4-BE49-F238E27FC236}">
+                <a16:creationId xmlns:a16="http://schemas.microsoft.com/office/drawing/2014/main" id="{B218607A-5447-4481-804C-6DF0FFEAB4B0}"/>
+              </a:ext>
+            </a:extLst>
+          </p:cNvPr>
+          <p:cNvPicPr>
+            <a:picLocks noChangeAspect="1"/>
+          </p:cNvPicPr>
+          <p:nvPr/>
+        </p:nvPicPr>
+        <p:blipFill rotWithShape="1">
+          <a:blip r:embed="rId2"/>
+          <a:srcRect l="3613" t="66297" r="46290" b="4536"/>
+          <a:stretch/>
+        </p:blipFill>
+        <p:spPr>
+          <a:xfrm>
+            <a:off x="1905000" y="5727700"/>
+            <a:ext cx="9578748" cy="3136900"/>
+          </a:xfrm>
+          <a:prstGeom prst="rect">
+            <a:avLst/>
+          </a:prstGeom>
+        </p:spPr>
+      </p:pic>
     </p:spTree>
     <p:extLst>
       <p:ext uri="{BB962C8B-B14F-4D97-AF65-F5344CB8AC3E}">
-        <p14:creationId xmlns:p14="http://schemas.microsoft.com/office/powerpoint/2010/main" val="3826684176"/>
+        <p14:creationId xmlns:p14="http://schemas.microsoft.com/office/powerpoint/2010/main" val="202249396"/>
       </p:ext>
     </p:extLst>
   </p:cSld>
@@ -3694,100 +5016,325 @@
       </p:grpSpPr>
       <p:sp>
         <p:nvSpPr>
-          <p:cNvPr id="2" name="Title 1">
+          <p:cNvPr id="4" name="TextBox 3">
             <a:extLst>
               <a:ext uri="{FF2B5EF4-FFF2-40B4-BE49-F238E27FC236}">
-                <a16:creationId xmlns:a16="http://schemas.microsoft.com/office/drawing/2014/main" id="{29128785-1A9E-432C-B375-F49E5D303C10}"/>
+                <a16:creationId xmlns:a16="http://schemas.microsoft.com/office/drawing/2014/main" id="{D019A569-23AE-45AD-9384-2FBE7FF5DD3B}"/>
               </a:ext>
             </a:extLst>
           </p:cNvPr>
-          <p:cNvSpPr>
-            <a:spLocks noGrp="1"/>
-          </p:cNvSpPr>
-          <p:nvPr>
-            <p:ph type="title"/>
-          </p:nvPr>
+          <p:cNvSpPr txBox="1"/>
+          <p:nvPr/>
         </p:nvSpPr>
-        <p:spPr/>
+        <p:spPr>
+          <a:xfrm>
+            <a:off x="971550" y="4336932"/>
+            <a:ext cx="11061700" cy="595035"/>
+          </a:xfrm>
+          <a:prstGeom prst="rect">
+            <a:avLst/>
+          </a:prstGeom>
+          <a:noFill/>
+          <a:ln w="12700" cap="flat">
+            <a:noFill/>
+            <a:miter lim="400000"/>
+          </a:ln>
+          <a:effectLst/>
+          <a:sp3d/>
+        </p:spPr>
+        <p:style>
+          <a:lnRef idx="0">
+            <a:scrgbClr r="0" g="0" b="0"/>
+          </a:lnRef>
+          <a:fillRef idx="0">
+            <a:scrgbClr r="0" g="0" b="0"/>
+          </a:fillRef>
+          <a:effectRef idx="0">
+            <a:scrgbClr r="0" g="0" b="0"/>
+          </a:effectRef>
+          <a:fontRef idx="none"/>
+        </p:style>
         <p:txBody>
-          <a:bodyPr/>
+          <a:bodyPr rot="0" spcFirstLastPara="1" vertOverflow="overflow" horzOverflow="overflow" vert="horz" wrap="square" lIns="50800" tIns="50800" rIns="50800" bIns="50800" numCol="1" spcCol="38100" rtlCol="0" anchor="ctr">
+            <a:spAutoFit/>
+          </a:bodyPr>
           <a:lstStyle/>
           <a:p>
             <a:r>
-              <a:rPr lang="en-US" dirty="0"/>
-              <a:t>SQL</a:t>
-            </a:r>
+              <a:rPr lang="en-US" sz="3200" b="0" dirty="0">
+                <a:latin typeface="Courier New" panose="02070309020205020404" pitchFamily="49" charset="0"/>
+                <a:cs typeface="Courier New" panose="02070309020205020404" pitchFamily="49" charset="0"/>
+              </a:rPr>
+              <a:t>trees</a:t>
+            </a:r>
+            <a:r>
+              <a:rPr lang="en-US" sz="3200" dirty="0">
+                <a:solidFill>
+                  <a:srgbClr val="00B0F0"/>
+                </a:solidFill>
+                <a:latin typeface="Courier New" panose="02070309020205020404" pitchFamily="49" charset="0"/>
+                <a:cs typeface="Courier New" panose="02070309020205020404" pitchFamily="49" charset="0"/>
+              </a:rPr>
+              <a:t>[</a:t>
+            </a:r>
+            <a:r>
+              <a:rPr lang="en-US" sz="3200" b="0" dirty="0">
+                <a:latin typeface="Courier New" panose="02070309020205020404" pitchFamily="49" charset="0"/>
+                <a:cs typeface="Courier New" panose="02070309020205020404" pitchFamily="49" charset="0"/>
+              </a:rPr>
+              <a:t>trees</a:t>
+            </a:r>
+            <a:r>
+              <a:rPr lang="en-US" sz="3200" dirty="0">
+                <a:solidFill>
+                  <a:srgbClr val="FF0000"/>
+                </a:solidFill>
+                <a:latin typeface="Courier New" panose="02070309020205020404" pitchFamily="49" charset="0"/>
+                <a:cs typeface="Courier New" panose="02070309020205020404" pitchFamily="49" charset="0"/>
+              </a:rPr>
+              <a:t>[</a:t>
+            </a:r>
+            <a:r>
+              <a:rPr lang="en-US" sz="3200" b="0" dirty="0">
+                <a:latin typeface="Courier New" panose="02070309020205020404" pitchFamily="49" charset="0"/>
+                <a:cs typeface="Courier New" panose="02070309020205020404" pitchFamily="49" charset="0"/>
+              </a:rPr>
+              <a:t>"priority"</a:t>
+            </a:r>
+            <a:r>
+              <a:rPr lang="en-US" sz="3200" dirty="0">
+                <a:solidFill>
+                  <a:srgbClr val="FF0000"/>
+                </a:solidFill>
+                <a:latin typeface="Courier New" panose="02070309020205020404" pitchFamily="49" charset="0"/>
+                <a:cs typeface="Courier New" panose="02070309020205020404" pitchFamily="49" charset="0"/>
+              </a:rPr>
+              <a:t>]</a:t>
+            </a:r>
+            <a:r>
+              <a:rPr lang="en-US" sz="3200" b="0" dirty="0">
+                <a:latin typeface="Courier New" panose="02070309020205020404" pitchFamily="49" charset="0"/>
+                <a:cs typeface="Courier New" panose="02070309020205020404" pitchFamily="49" charset="0"/>
+              </a:rPr>
+              <a:t> &gt; 90</a:t>
+            </a:r>
+            <a:r>
+              <a:rPr lang="en-US" sz="3200" dirty="0">
+                <a:solidFill>
+                  <a:srgbClr val="00B0F0"/>
+                </a:solidFill>
+                <a:latin typeface="Courier New" panose="02070309020205020404" pitchFamily="49" charset="0"/>
+                <a:cs typeface="Courier New" panose="02070309020205020404" pitchFamily="49" charset="0"/>
+              </a:rPr>
+              <a:t>]</a:t>
+            </a:r>
+            <a:r>
+              <a:rPr lang="en-US" sz="3200" dirty="0">
+                <a:solidFill>
+                  <a:srgbClr val="7030A0"/>
+                </a:solidFill>
+                <a:latin typeface="Courier New" panose="02070309020205020404" pitchFamily="49" charset="0"/>
+                <a:cs typeface="Courier New" panose="02070309020205020404" pitchFamily="49" charset="0"/>
+              </a:rPr>
+              <a:t>[</a:t>
+            </a:r>
+            <a:r>
+              <a:rPr lang="en-US" sz="3200" dirty="0">
+                <a:solidFill>
+                  <a:srgbClr val="00B050"/>
+                </a:solidFill>
+                <a:latin typeface="Courier New" panose="02070309020205020404" pitchFamily="49" charset="0"/>
+                <a:cs typeface="Courier New" panose="02070309020205020404" pitchFamily="49" charset="0"/>
+              </a:rPr>
+              <a:t>[</a:t>
+            </a:r>
+            <a:r>
+              <a:rPr lang="en-US" sz="3200" b="0" dirty="0">
+                <a:latin typeface="Courier New" panose="02070309020205020404" pitchFamily="49" charset="0"/>
+                <a:cs typeface="Courier New" panose="02070309020205020404" pitchFamily="49" charset="0"/>
+              </a:rPr>
+              <a:t>"x", "y"</a:t>
+            </a:r>
+            <a:r>
+              <a:rPr lang="en-US" sz="3200" dirty="0">
+                <a:solidFill>
+                  <a:srgbClr val="00B050"/>
+                </a:solidFill>
+                <a:latin typeface="Courier New" panose="02070309020205020404" pitchFamily="49" charset="0"/>
+                <a:cs typeface="Courier New" panose="02070309020205020404" pitchFamily="49" charset="0"/>
+              </a:rPr>
+              <a:t>]</a:t>
+            </a:r>
+            <a:r>
+              <a:rPr lang="en-US" sz="3200" dirty="0">
+                <a:solidFill>
+                  <a:srgbClr val="7030A0"/>
+                </a:solidFill>
+                <a:latin typeface="Courier New" panose="02070309020205020404" pitchFamily="49" charset="0"/>
+                <a:cs typeface="Courier New" panose="02070309020205020404" pitchFamily="49" charset="0"/>
+              </a:rPr>
+              <a:t>]</a:t>
+            </a:r>
+            <a:r>
+              <a:rPr lang="en-US" sz="3200" b="0" dirty="0">
+                <a:latin typeface="Courier New" panose="02070309020205020404" pitchFamily="49" charset="0"/>
+                <a:cs typeface="Courier New" panose="02070309020205020404" pitchFamily="49" charset="0"/>
+              </a:rPr>
+              <a:t> </a:t>
+            </a:r>
+            <a:endParaRPr kumimoji="0" lang="en-US" sz="3200" b="0" i="0" u="none" strike="noStrike" cap="none" spc="0" normalizeH="0" baseline="0" dirty="0">
+              <a:ln>
+                <a:noFill/>
+              </a:ln>
+              <a:solidFill>
+                <a:srgbClr val="000000"/>
+              </a:solidFill>
+              <a:effectLst/>
+              <a:uFillTx/>
+              <a:latin typeface="Courier New" panose="02070309020205020404" pitchFamily="49" charset="0"/>
+              <a:cs typeface="Courier New" panose="02070309020205020404" pitchFamily="49" charset="0"/>
+              <a:sym typeface="Gill Sans"/>
+            </a:endParaRPr>
           </a:p>
         </p:txBody>
       </p:sp>
       <p:sp>
         <p:nvSpPr>
-          <p:cNvPr id="3" name="Text Placeholder 2">
+          <p:cNvPr id="5" name="Right Brace 4">
             <a:extLst>
               <a:ext uri="{FF2B5EF4-FFF2-40B4-BE49-F238E27FC236}">
-                <a16:creationId xmlns:a16="http://schemas.microsoft.com/office/drawing/2014/main" id="{1B3AF792-85F2-4902-8DEE-FD7847AEF232}"/>
+                <a16:creationId xmlns:a16="http://schemas.microsoft.com/office/drawing/2014/main" id="{2D6A4E87-43FF-4D2A-BA0E-C24E07DCB8FD}"/>
               </a:ext>
             </a:extLst>
           </p:cNvPr>
-          <p:cNvSpPr>
-            <a:spLocks noGrp="1"/>
-          </p:cNvSpPr>
-          <p:nvPr>
-            <p:ph type="body" idx="1"/>
-          </p:nvPr>
+          <p:cNvSpPr/>
+          <p:nvPr/>
         </p:nvSpPr>
         <p:spPr>
-          <a:xfrm>
-            <a:off x="1905000" y="2552700"/>
-            <a:ext cx="11099800" cy="6286500"/>
+          <a:xfrm rot="5400000">
+            <a:off x="5416550" y="2398317"/>
+            <a:ext cx="495300" cy="5562599"/>
           </a:xfrm>
+          <a:prstGeom prst="rightBrace">
+            <a:avLst/>
+          </a:prstGeom>
+          <a:ln w="38100">
+            <a:solidFill>
+              <a:srgbClr val="00B0F0"/>
+            </a:solidFill>
+          </a:ln>
         </p:spPr>
+        <p:style>
+          <a:lnRef idx="1">
+            <a:schemeClr val="accent5"/>
+          </a:lnRef>
+          <a:fillRef idx="0">
+            <a:schemeClr val="accent5"/>
+          </a:fillRef>
+          <a:effectRef idx="0">
+            <a:schemeClr val="accent5"/>
+          </a:effectRef>
+          <a:fontRef idx="minor">
+            <a:schemeClr val="tx1"/>
+          </a:fontRef>
+        </p:style>
         <p:txBody>
-          <a:bodyPr/>
+          <a:bodyPr rot="0" spcFirstLastPara="1" vertOverflow="overflow" horzOverflow="overflow" vert="horz" wrap="square" lIns="91439" tIns="45719" rIns="91439" bIns="45719" numCol="1" spcCol="38100" rtlCol="0" anchor="t">
+            <a:noAutofit/>
+          </a:bodyPr>
           <a:lstStyle/>
           <a:p>
-            <a:r>
-              <a:rPr lang="en-US" dirty="0"/>
-              <a:t>SELECT - columns</a:t>
-            </a:r>
-          </a:p>
-          <a:p>
-            <a:r>
-              <a:rPr lang="en-US" dirty="0"/>
-              <a:t>FROM - table</a:t>
-            </a:r>
-          </a:p>
-          <a:p>
-            <a:r>
-              <a:rPr lang="en-US" dirty="0"/>
-              <a:t>WHERE – rows</a:t>
-            </a:r>
-          </a:p>
-          <a:p>
-            <a:r>
-              <a:rPr lang="en-US" dirty="0">
-                <a:solidFill>
-                  <a:srgbClr val="FF0000"/>
-                </a:solidFill>
-              </a:rPr>
-              <a:t>ORDER BY - sorting</a:t>
-            </a:r>
-          </a:p>
-          <a:p>
-            <a:r>
-              <a:rPr lang="en-US" dirty="0"/>
-              <a:t>LIMIT - rows</a:t>
-            </a:r>
-          </a:p>
-          <a:p>
-            <a:endParaRPr lang="en-US" dirty="0"/>
+            <a:pPr marL="0" marR="0" indent="0" algn="l" defTabSz="914400" rtl="0" fontAlgn="auto" latinLnBrk="1" hangingPunct="0">
+              <a:lnSpc>
+                <a:spcPct val="100000"/>
+              </a:lnSpc>
+              <a:spcBef>
+                <a:spcPts val="0"/>
+              </a:spcBef>
+              <a:spcAft>
+                <a:spcPts val="0"/>
+              </a:spcAft>
+              <a:buClrTx/>
+              <a:buSzTx/>
+              <a:buFontTx/>
+              <a:buNone/>
+              <a:tabLst/>
+            </a:pPr>
+            <a:endParaRPr kumimoji="0" lang="en-US" sz="1800" i="0" u="none" strike="noStrike" cap="none" spc="0" normalizeH="0" baseline="0" dirty="0">
+              <a:ln>
+                <a:noFill/>
+              </a:ln>
+              <a:solidFill>
+                <a:srgbClr val="000000"/>
+              </a:solidFill>
+              <a:effectLst/>
+              <a:uFillTx/>
+            </a:endParaRPr>
           </a:p>
         </p:txBody>
       </p:sp>
+      <p:pic>
+        <p:nvPicPr>
+          <p:cNvPr id="6" name="Picture 5">
+            <a:extLst>
+              <a:ext uri="{FF2B5EF4-FFF2-40B4-BE49-F238E27FC236}">
+                <a16:creationId xmlns:a16="http://schemas.microsoft.com/office/drawing/2014/main" id="{851715FA-A71D-467E-B8DD-289CFCAA666F}"/>
+              </a:ext>
+            </a:extLst>
+          </p:cNvPr>
+          <p:cNvPicPr>
+            <a:picLocks noChangeAspect="1"/>
+          </p:cNvPicPr>
+          <p:nvPr/>
+        </p:nvPicPr>
+        <p:blipFill rotWithShape="1">
+          <a:blip r:embed="rId2"/>
+          <a:srcRect t="21092" r="46289" b="33119"/>
+          <a:stretch/>
+        </p:blipFill>
+        <p:spPr>
+          <a:xfrm>
+            <a:off x="1473200" y="0"/>
+            <a:ext cx="9021912" cy="4326334"/>
+          </a:xfrm>
+          <a:prstGeom prst="rect">
+            <a:avLst/>
+          </a:prstGeom>
+        </p:spPr>
+      </p:pic>
+      <p:pic>
+        <p:nvPicPr>
+          <p:cNvPr id="2" name="Picture 1">
+            <a:extLst>
+              <a:ext uri="{FF2B5EF4-FFF2-40B4-BE49-F238E27FC236}">
+                <a16:creationId xmlns:a16="http://schemas.microsoft.com/office/drawing/2014/main" id="{C4E5889C-46B1-4286-A847-5CE6432A030F}"/>
+              </a:ext>
+            </a:extLst>
+          </p:cNvPr>
+          <p:cNvPicPr>
+            <a:picLocks noChangeAspect="1"/>
+          </p:cNvPicPr>
+          <p:nvPr/>
+        </p:nvPicPr>
+        <p:blipFill rotWithShape="1">
+          <a:blip r:embed="rId3"/>
+          <a:srcRect l="3809" t="67361" r="61523" b="4514"/>
+          <a:stretch/>
+        </p:blipFill>
+        <p:spPr>
+          <a:xfrm>
+            <a:off x="1549400" y="5551764"/>
+            <a:ext cx="7099300" cy="3239681"/>
+          </a:xfrm>
+          <a:prstGeom prst="rect">
+            <a:avLst/>
+          </a:prstGeom>
+        </p:spPr>
+      </p:pic>
     </p:spTree>
     <p:extLst>
       <p:ext uri="{BB962C8B-B14F-4D97-AF65-F5344CB8AC3E}">
-        <p14:creationId xmlns:p14="http://schemas.microsoft.com/office/powerpoint/2010/main" val="2478815195"/>
+        <p14:creationId xmlns:p14="http://schemas.microsoft.com/office/powerpoint/2010/main" val="2280343356"/>
       </p:ext>
     </p:extLst>
   </p:cSld>
@@ -3817,118 +5364,1198 @@
       </p:grpSpPr>
       <p:sp>
         <p:nvSpPr>
-          <p:cNvPr id="2" name="Title 1">
+          <p:cNvPr id="4" name="TextBox 3">
             <a:extLst>
               <a:ext uri="{FF2B5EF4-FFF2-40B4-BE49-F238E27FC236}">
-                <a16:creationId xmlns:a16="http://schemas.microsoft.com/office/drawing/2014/main" id="{29128785-1A9E-432C-B375-F49E5D303C10}"/>
+                <a16:creationId xmlns:a16="http://schemas.microsoft.com/office/drawing/2014/main" id="{D019A569-23AE-45AD-9384-2FBE7FF5DD3B}"/>
               </a:ext>
             </a:extLst>
           </p:cNvPr>
-          <p:cNvSpPr>
-            <a:spLocks noGrp="1"/>
-          </p:cNvSpPr>
-          <p:nvPr>
-            <p:ph type="title"/>
-          </p:nvPr>
+          <p:cNvSpPr txBox="1"/>
+          <p:nvPr/>
         </p:nvSpPr>
-        <p:spPr/>
+        <p:spPr>
+          <a:xfrm>
+            <a:off x="971550" y="4336932"/>
+            <a:ext cx="11061700" cy="595035"/>
+          </a:xfrm>
+          <a:prstGeom prst="rect">
+            <a:avLst/>
+          </a:prstGeom>
+          <a:noFill/>
+          <a:ln w="12700" cap="flat">
+            <a:noFill/>
+            <a:miter lim="400000"/>
+          </a:ln>
+          <a:effectLst/>
+          <a:sp3d/>
+        </p:spPr>
+        <p:style>
+          <a:lnRef idx="0">
+            <a:scrgbClr r="0" g="0" b="0"/>
+          </a:lnRef>
+          <a:fillRef idx="0">
+            <a:scrgbClr r="0" g="0" b="0"/>
+          </a:fillRef>
+          <a:effectRef idx="0">
+            <a:scrgbClr r="0" g="0" b="0"/>
+          </a:effectRef>
+          <a:fontRef idx="none"/>
+        </p:style>
         <p:txBody>
-          <a:bodyPr/>
+          <a:bodyPr rot="0" spcFirstLastPara="1" vertOverflow="overflow" horzOverflow="overflow" vert="horz" wrap="square" lIns="50800" tIns="50800" rIns="50800" bIns="50800" numCol="1" spcCol="38100" rtlCol="0" anchor="ctr">
+            <a:spAutoFit/>
+          </a:bodyPr>
           <a:lstStyle/>
           <a:p>
             <a:r>
-              <a:rPr lang="en-US" dirty="0"/>
-              <a:t>SQL</a:t>
-            </a:r>
+              <a:rPr lang="en-US" sz="3200" b="0" dirty="0">
+                <a:latin typeface="Courier New" panose="02070309020205020404" pitchFamily="49" charset="0"/>
+                <a:cs typeface="Courier New" panose="02070309020205020404" pitchFamily="49" charset="0"/>
+              </a:rPr>
+              <a:t>trees</a:t>
+            </a:r>
+            <a:r>
+              <a:rPr lang="en-US" sz="3200" dirty="0">
+                <a:solidFill>
+                  <a:srgbClr val="00B0F0"/>
+                </a:solidFill>
+                <a:latin typeface="Courier New" panose="02070309020205020404" pitchFamily="49" charset="0"/>
+                <a:cs typeface="Courier New" panose="02070309020205020404" pitchFamily="49" charset="0"/>
+              </a:rPr>
+              <a:t>[</a:t>
+            </a:r>
+            <a:r>
+              <a:rPr lang="en-US" sz="3200" b="0" dirty="0">
+                <a:latin typeface="Courier New" panose="02070309020205020404" pitchFamily="49" charset="0"/>
+                <a:cs typeface="Courier New" panose="02070309020205020404" pitchFamily="49" charset="0"/>
+              </a:rPr>
+              <a:t>trees</a:t>
+            </a:r>
+            <a:r>
+              <a:rPr lang="en-US" sz="3200" dirty="0">
+                <a:solidFill>
+                  <a:srgbClr val="FF0000"/>
+                </a:solidFill>
+                <a:latin typeface="Courier New" panose="02070309020205020404" pitchFamily="49" charset="0"/>
+                <a:cs typeface="Courier New" panose="02070309020205020404" pitchFamily="49" charset="0"/>
+              </a:rPr>
+              <a:t>[</a:t>
+            </a:r>
+            <a:r>
+              <a:rPr lang="en-US" sz="3200" b="0" dirty="0">
+                <a:latin typeface="Courier New" panose="02070309020205020404" pitchFamily="49" charset="0"/>
+                <a:cs typeface="Courier New" panose="02070309020205020404" pitchFamily="49" charset="0"/>
+              </a:rPr>
+              <a:t>"priority"</a:t>
+            </a:r>
+            <a:r>
+              <a:rPr lang="en-US" sz="3200" dirty="0">
+                <a:solidFill>
+                  <a:srgbClr val="FF0000"/>
+                </a:solidFill>
+                <a:latin typeface="Courier New" panose="02070309020205020404" pitchFamily="49" charset="0"/>
+                <a:cs typeface="Courier New" panose="02070309020205020404" pitchFamily="49" charset="0"/>
+              </a:rPr>
+              <a:t>]</a:t>
+            </a:r>
+            <a:r>
+              <a:rPr lang="en-US" sz="3200" b="0" dirty="0">
+                <a:latin typeface="Courier New" panose="02070309020205020404" pitchFamily="49" charset="0"/>
+                <a:cs typeface="Courier New" panose="02070309020205020404" pitchFamily="49" charset="0"/>
+              </a:rPr>
+              <a:t> &gt; 90</a:t>
+            </a:r>
+            <a:r>
+              <a:rPr lang="en-US" sz="3200" dirty="0">
+                <a:solidFill>
+                  <a:srgbClr val="00B0F0"/>
+                </a:solidFill>
+                <a:latin typeface="Courier New" panose="02070309020205020404" pitchFamily="49" charset="0"/>
+                <a:cs typeface="Courier New" panose="02070309020205020404" pitchFamily="49" charset="0"/>
+              </a:rPr>
+              <a:t>]</a:t>
+            </a:r>
+            <a:r>
+              <a:rPr lang="en-US" sz="3200" dirty="0">
+                <a:solidFill>
+                  <a:srgbClr val="7030A0"/>
+                </a:solidFill>
+                <a:latin typeface="Courier New" panose="02070309020205020404" pitchFamily="49" charset="0"/>
+                <a:cs typeface="Courier New" panose="02070309020205020404" pitchFamily="49" charset="0"/>
+              </a:rPr>
+              <a:t>[</a:t>
+            </a:r>
+            <a:r>
+              <a:rPr lang="en-US" sz="3200" dirty="0">
+                <a:solidFill>
+                  <a:srgbClr val="00B050"/>
+                </a:solidFill>
+                <a:latin typeface="Courier New" panose="02070309020205020404" pitchFamily="49" charset="0"/>
+                <a:cs typeface="Courier New" panose="02070309020205020404" pitchFamily="49" charset="0"/>
+              </a:rPr>
+              <a:t>[</a:t>
+            </a:r>
+            <a:r>
+              <a:rPr lang="en-US" sz="3200" b="0" dirty="0">
+                <a:latin typeface="Courier New" panose="02070309020205020404" pitchFamily="49" charset="0"/>
+                <a:cs typeface="Courier New" panose="02070309020205020404" pitchFamily="49" charset="0"/>
+              </a:rPr>
+              <a:t>"x", "y"</a:t>
+            </a:r>
+            <a:r>
+              <a:rPr lang="en-US" sz="3200" dirty="0">
+                <a:solidFill>
+                  <a:srgbClr val="00B050"/>
+                </a:solidFill>
+                <a:latin typeface="Courier New" panose="02070309020205020404" pitchFamily="49" charset="0"/>
+                <a:cs typeface="Courier New" panose="02070309020205020404" pitchFamily="49" charset="0"/>
+              </a:rPr>
+              <a:t>]</a:t>
+            </a:r>
+            <a:r>
+              <a:rPr lang="en-US" sz="3200" dirty="0">
+                <a:solidFill>
+                  <a:srgbClr val="7030A0"/>
+                </a:solidFill>
+                <a:latin typeface="Courier New" panose="02070309020205020404" pitchFamily="49" charset="0"/>
+                <a:cs typeface="Courier New" panose="02070309020205020404" pitchFamily="49" charset="0"/>
+              </a:rPr>
+              <a:t>]</a:t>
+            </a:r>
+            <a:r>
+              <a:rPr lang="en-US" sz="3200" b="0" dirty="0">
+                <a:latin typeface="Courier New" panose="02070309020205020404" pitchFamily="49" charset="0"/>
+                <a:cs typeface="Courier New" panose="02070309020205020404" pitchFamily="49" charset="0"/>
+              </a:rPr>
+              <a:t> </a:t>
+            </a:r>
+            <a:endParaRPr kumimoji="0" lang="en-US" sz="3200" b="0" i="0" u="none" strike="noStrike" cap="none" spc="0" normalizeH="0" baseline="0" dirty="0">
+              <a:ln>
+                <a:noFill/>
+              </a:ln>
+              <a:solidFill>
+                <a:srgbClr val="000000"/>
+              </a:solidFill>
+              <a:effectLst/>
+              <a:uFillTx/>
+              <a:latin typeface="Courier New" panose="02070309020205020404" pitchFamily="49" charset="0"/>
+              <a:cs typeface="Courier New" panose="02070309020205020404" pitchFamily="49" charset="0"/>
+              <a:sym typeface="Gill Sans"/>
+            </a:endParaRPr>
           </a:p>
         </p:txBody>
       </p:sp>
       <p:sp>
         <p:nvSpPr>
-          <p:cNvPr id="3" name="Text Placeholder 2">
+          <p:cNvPr id="5" name="Right Brace 4">
             <a:extLst>
               <a:ext uri="{FF2B5EF4-FFF2-40B4-BE49-F238E27FC236}">
-                <a16:creationId xmlns:a16="http://schemas.microsoft.com/office/drawing/2014/main" id="{1B3AF792-85F2-4902-8DEE-FD7847AEF232}"/>
+                <a16:creationId xmlns:a16="http://schemas.microsoft.com/office/drawing/2014/main" id="{2D6A4E87-43FF-4D2A-BA0E-C24E07DCB8FD}"/>
               </a:ext>
             </a:extLst>
           </p:cNvPr>
-          <p:cNvSpPr>
-            <a:spLocks noGrp="1"/>
-          </p:cNvSpPr>
-          <p:nvPr>
-            <p:ph type="body" idx="1"/>
-          </p:nvPr>
+          <p:cNvSpPr/>
+          <p:nvPr/>
+        </p:nvSpPr>
+        <p:spPr>
+          <a:xfrm rot="5400000">
+            <a:off x="4711700" y="1693467"/>
+            <a:ext cx="495300" cy="6972300"/>
+          </a:xfrm>
+          <a:prstGeom prst="rightBrace">
+            <a:avLst/>
+          </a:prstGeom>
+          <a:ln w="38100">
+            <a:solidFill>
+              <a:srgbClr val="00B0F0"/>
+            </a:solidFill>
+          </a:ln>
+        </p:spPr>
+        <p:style>
+          <a:lnRef idx="1">
+            <a:schemeClr val="accent5"/>
+          </a:lnRef>
+          <a:fillRef idx="0">
+            <a:schemeClr val="accent5"/>
+          </a:fillRef>
+          <a:effectRef idx="0">
+            <a:schemeClr val="accent5"/>
+          </a:effectRef>
+          <a:fontRef idx="minor">
+            <a:schemeClr val="tx1"/>
+          </a:fontRef>
+        </p:style>
+        <p:txBody>
+          <a:bodyPr rot="0" spcFirstLastPara="1" vertOverflow="overflow" horzOverflow="overflow" vert="horz" wrap="square" lIns="91439" tIns="45719" rIns="91439" bIns="45719" numCol="1" spcCol="38100" rtlCol="0" anchor="t">
+            <a:noAutofit/>
+          </a:bodyPr>
+          <a:lstStyle/>
+          <a:p>
+            <a:pPr marL="0" marR="0" indent="0" algn="l" defTabSz="914400" rtl="0" fontAlgn="auto" latinLnBrk="1" hangingPunct="0">
+              <a:lnSpc>
+                <a:spcPct val="100000"/>
+              </a:lnSpc>
+              <a:spcBef>
+                <a:spcPts val="0"/>
+              </a:spcBef>
+              <a:spcAft>
+                <a:spcPts val="0"/>
+              </a:spcAft>
+              <a:buClrTx/>
+              <a:buSzTx/>
+              <a:buFontTx/>
+              <a:buNone/>
+              <a:tabLst/>
+            </a:pPr>
+            <a:endParaRPr kumimoji="0" lang="en-US" sz="1800" i="0" u="none" strike="noStrike" cap="none" spc="0" normalizeH="0" baseline="0" dirty="0">
+              <a:ln>
+                <a:noFill/>
+              </a:ln>
+              <a:solidFill>
+                <a:srgbClr val="000000"/>
+              </a:solidFill>
+              <a:effectLst/>
+              <a:uFillTx/>
+            </a:endParaRPr>
+          </a:p>
+        </p:txBody>
+      </p:sp>
+      <p:pic>
+        <p:nvPicPr>
+          <p:cNvPr id="6" name="Picture 5">
+            <a:extLst>
+              <a:ext uri="{FF2B5EF4-FFF2-40B4-BE49-F238E27FC236}">
+                <a16:creationId xmlns:a16="http://schemas.microsoft.com/office/drawing/2014/main" id="{851715FA-A71D-467E-B8DD-289CFCAA666F}"/>
+              </a:ext>
+            </a:extLst>
+          </p:cNvPr>
+          <p:cNvPicPr>
+            <a:picLocks noChangeAspect="1"/>
+          </p:cNvPicPr>
+          <p:nvPr/>
+        </p:nvPicPr>
+        <p:blipFill rotWithShape="1">
+          <a:blip r:embed="rId2"/>
+          <a:srcRect t="21092" r="46289" b="33119"/>
+          <a:stretch/>
+        </p:blipFill>
+        <p:spPr>
+          <a:xfrm>
+            <a:off x="1473200" y="0"/>
+            <a:ext cx="9021912" cy="4326334"/>
+          </a:xfrm>
+          <a:prstGeom prst="rect">
+            <a:avLst/>
+          </a:prstGeom>
+        </p:spPr>
+      </p:pic>
+      <p:pic>
+        <p:nvPicPr>
+          <p:cNvPr id="3" name="Picture 2">
+            <a:extLst>
+              <a:ext uri="{FF2B5EF4-FFF2-40B4-BE49-F238E27FC236}">
+                <a16:creationId xmlns:a16="http://schemas.microsoft.com/office/drawing/2014/main" id="{B922F1EC-3866-4A76-98C3-037BD874B5CD}"/>
+              </a:ext>
+            </a:extLst>
+          </p:cNvPr>
+          <p:cNvPicPr>
+            <a:picLocks noChangeAspect="1"/>
+          </p:cNvPicPr>
+          <p:nvPr/>
+        </p:nvPicPr>
+        <p:blipFill>
+          <a:blip r:embed="rId3"/>
+          <a:stretch>
+            <a:fillRect/>
+          </a:stretch>
+        </p:blipFill>
+        <p:spPr>
+          <a:xfrm>
+            <a:off x="1855379" y="5792603"/>
+            <a:ext cx="7641471" cy="3452997"/>
+          </a:xfrm>
+          <a:prstGeom prst="rect">
+            <a:avLst/>
+          </a:prstGeom>
+        </p:spPr>
+      </p:pic>
+    </p:spTree>
+    <p:extLst>
+      <p:ext uri="{BB962C8B-B14F-4D97-AF65-F5344CB8AC3E}">
+        <p14:creationId xmlns:p14="http://schemas.microsoft.com/office/powerpoint/2010/main" val="3872313079"/>
+      </p:ext>
+    </p:extLst>
+  </p:cSld>
+  <p:clrMapOvr>
+    <a:masterClrMapping/>
+  </p:clrMapOvr>
+  <p:transition spd="med"/>
+</p:sld>
+</file>
+
+<file path=ppt/slides/slide8.xml><?xml version="1.0" encoding="utf-8"?>
+<p:sld xmlns:a="http://schemas.openxmlformats.org/drawingml/2006/main" xmlns:r="http://schemas.openxmlformats.org/officeDocument/2006/relationships" xmlns:p="http://schemas.openxmlformats.org/presentationml/2006/main">
+  <p:cSld>
+    <p:spTree>
+      <p:nvGrpSpPr>
+        <p:cNvPr id="1" name=""/>
+        <p:cNvGrpSpPr/>
+        <p:nvPr/>
+      </p:nvGrpSpPr>
+      <p:grpSpPr>
+        <a:xfrm>
+          <a:off x="0" y="0"/>
+          <a:ext cx="0" cy="0"/>
+          <a:chOff x="0" y="0"/>
+          <a:chExt cx="0" cy="0"/>
+        </a:xfrm>
+      </p:grpSpPr>
+      <p:sp>
+        <p:nvSpPr>
+          <p:cNvPr id="4" name="TextBox 3">
+            <a:extLst>
+              <a:ext uri="{FF2B5EF4-FFF2-40B4-BE49-F238E27FC236}">
+                <a16:creationId xmlns:a16="http://schemas.microsoft.com/office/drawing/2014/main" id="{D019A569-23AE-45AD-9384-2FBE7FF5DD3B}"/>
+              </a:ext>
+            </a:extLst>
+          </p:cNvPr>
+          <p:cNvSpPr txBox="1"/>
+          <p:nvPr/>
         </p:nvSpPr>
         <p:spPr>
           <a:xfrm>
-            <a:off x="1905000" y="2552700"/>
-            <a:ext cx="11099800" cy="6286500"/>
+            <a:off x="971550" y="4336932"/>
+            <a:ext cx="11061700" cy="595035"/>
           </a:xfrm>
+          <a:prstGeom prst="rect">
+            <a:avLst/>
+          </a:prstGeom>
+          <a:noFill/>
+          <a:ln w="12700" cap="flat">
+            <a:noFill/>
+            <a:miter lim="400000"/>
+          </a:ln>
+          <a:effectLst/>
+          <a:sp3d/>
         </p:spPr>
+        <p:style>
+          <a:lnRef idx="0">
+            <a:scrgbClr r="0" g="0" b="0"/>
+          </a:lnRef>
+          <a:fillRef idx="0">
+            <a:scrgbClr r="0" g="0" b="0"/>
+          </a:fillRef>
+          <a:effectRef idx="0">
+            <a:scrgbClr r="0" g="0" b="0"/>
+          </a:effectRef>
+          <a:fontRef idx="none"/>
+        </p:style>
         <p:txBody>
-          <a:bodyPr>
-            <a:normAutofit fontScale="92500" lnSpcReduction="10000"/>
+          <a:bodyPr rot="0" spcFirstLastPara="1" vertOverflow="overflow" horzOverflow="overflow" vert="horz" wrap="square" lIns="50800" tIns="50800" rIns="50800" bIns="50800" numCol="1" spcCol="38100" rtlCol="0" anchor="ctr">
+            <a:spAutoFit/>
           </a:bodyPr>
           <a:lstStyle/>
           <a:p>
             <a:r>
-              <a:rPr lang="en-US" dirty="0"/>
-              <a:t>SELECT - columns</a:t>
-            </a:r>
-          </a:p>
-          <a:p>
-            <a:r>
-              <a:rPr lang="en-US" dirty="0"/>
-              <a:t>FROM - table</a:t>
-            </a:r>
-          </a:p>
-          <a:p>
-            <a:r>
-              <a:rPr lang="en-US" dirty="0"/>
-              <a:t>WHERE – rows</a:t>
-            </a:r>
-          </a:p>
-          <a:p>
-            <a:r>
-              <a:rPr lang="en-US" dirty="0">
+              <a:rPr lang="en-US" sz="3200" b="0" dirty="0">
+                <a:latin typeface="Courier New" panose="02070309020205020404" pitchFamily="49" charset="0"/>
+                <a:cs typeface="Courier New" panose="02070309020205020404" pitchFamily="49" charset="0"/>
+              </a:rPr>
+              <a:t>trees</a:t>
+            </a:r>
+            <a:r>
+              <a:rPr lang="en-US" sz="3200" dirty="0">
+                <a:solidFill>
+                  <a:srgbClr val="00B0F0"/>
+                </a:solidFill>
+                <a:latin typeface="Courier New" panose="02070309020205020404" pitchFamily="49" charset="0"/>
+                <a:cs typeface="Courier New" panose="02070309020205020404" pitchFamily="49" charset="0"/>
+              </a:rPr>
+              <a:t>[</a:t>
+            </a:r>
+            <a:r>
+              <a:rPr lang="en-US" sz="3200" b="0" dirty="0">
+                <a:latin typeface="Courier New" panose="02070309020205020404" pitchFamily="49" charset="0"/>
+                <a:cs typeface="Courier New" panose="02070309020205020404" pitchFamily="49" charset="0"/>
+              </a:rPr>
+              <a:t>trees</a:t>
+            </a:r>
+            <a:r>
+              <a:rPr lang="en-US" sz="3200" dirty="0">
                 <a:solidFill>
                   <a:srgbClr val="FF0000"/>
                 </a:solidFill>
-              </a:rPr>
-              <a:t>GROUP BY</a:t>
-            </a:r>
-          </a:p>
-          <a:p>
-            <a:r>
-              <a:rPr lang="en-US" dirty="0">
+                <a:latin typeface="Courier New" panose="02070309020205020404" pitchFamily="49" charset="0"/>
+                <a:cs typeface="Courier New" panose="02070309020205020404" pitchFamily="49" charset="0"/>
+              </a:rPr>
+              <a:t>[</a:t>
+            </a:r>
+            <a:r>
+              <a:rPr lang="en-US" sz="3200" b="0" dirty="0">
+                <a:latin typeface="Courier New" panose="02070309020205020404" pitchFamily="49" charset="0"/>
+                <a:cs typeface="Courier New" panose="02070309020205020404" pitchFamily="49" charset="0"/>
+              </a:rPr>
+              <a:t>"priority"</a:t>
+            </a:r>
+            <a:r>
+              <a:rPr lang="en-US" sz="3200" dirty="0">
                 <a:solidFill>
                   <a:srgbClr val="FF0000"/>
                 </a:solidFill>
-              </a:rPr>
-              <a:t>HAVING</a:t>
-            </a:r>
-          </a:p>
-          <a:p>
-            <a:r>
-              <a:rPr lang="en-US" dirty="0"/>
-              <a:t>ORDER BY - sorting</a:t>
-            </a:r>
-          </a:p>
-          <a:p>
-            <a:r>
-              <a:rPr lang="en-US" dirty="0"/>
-              <a:t>LIMIT - rows</a:t>
-            </a:r>
-          </a:p>
-          <a:p>
-            <a:endParaRPr lang="en-US" dirty="0"/>
+                <a:latin typeface="Courier New" panose="02070309020205020404" pitchFamily="49" charset="0"/>
+                <a:cs typeface="Courier New" panose="02070309020205020404" pitchFamily="49" charset="0"/>
+              </a:rPr>
+              <a:t>]</a:t>
+            </a:r>
+            <a:r>
+              <a:rPr lang="en-US" sz="3200" b="0" dirty="0">
+                <a:latin typeface="Courier New" panose="02070309020205020404" pitchFamily="49" charset="0"/>
+                <a:cs typeface="Courier New" panose="02070309020205020404" pitchFamily="49" charset="0"/>
+              </a:rPr>
+              <a:t> &gt; 90</a:t>
+            </a:r>
+            <a:r>
+              <a:rPr lang="en-US" sz="3200" dirty="0">
+                <a:solidFill>
+                  <a:srgbClr val="00B0F0"/>
+                </a:solidFill>
+                <a:latin typeface="Courier New" panose="02070309020205020404" pitchFamily="49" charset="0"/>
+                <a:cs typeface="Courier New" panose="02070309020205020404" pitchFamily="49" charset="0"/>
+              </a:rPr>
+              <a:t>]</a:t>
+            </a:r>
+            <a:r>
+              <a:rPr lang="en-US" sz="3200" dirty="0">
+                <a:solidFill>
+                  <a:srgbClr val="7030A0"/>
+                </a:solidFill>
+                <a:latin typeface="Courier New" panose="02070309020205020404" pitchFamily="49" charset="0"/>
+                <a:cs typeface="Courier New" panose="02070309020205020404" pitchFamily="49" charset="0"/>
+              </a:rPr>
+              <a:t>[</a:t>
+            </a:r>
+            <a:r>
+              <a:rPr lang="en-US" sz="3200" dirty="0">
+                <a:solidFill>
+                  <a:srgbClr val="00B050"/>
+                </a:solidFill>
+                <a:latin typeface="Courier New" panose="02070309020205020404" pitchFamily="49" charset="0"/>
+                <a:cs typeface="Courier New" panose="02070309020205020404" pitchFamily="49" charset="0"/>
+              </a:rPr>
+              <a:t>[</a:t>
+            </a:r>
+            <a:r>
+              <a:rPr lang="en-US" sz="3200" b="0" dirty="0">
+                <a:latin typeface="Courier New" panose="02070309020205020404" pitchFamily="49" charset="0"/>
+                <a:cs typeface="Courier New" panose="02070309020205020404" pitchFamily="49" charset="0"/>
+              </a:rPr>
+              <a:t>"x", "y"</a:t>
+            </a:r>
+            <a:r>
+              <a:rPr lang="en-US" sz="3200" dirty="0">
+                <a:solidFill>
+                  <a:srgbClr val="00B050"/>
+                </a:solidFill>
+                <a:latin typeface="Courier New" panose="02070309020205020404" pitchFamily="49" charset="0"/>
+                <a:cs typeface="Courier New" panose="02070309020205020404" pitchFamily="49" charset="0"/>
+              </a:rPr>
+              <a:t>]</a:t>
+            </a:r>
+            <a:r>
+              <a:rPr lang="en-US" sz="3200" dirty="0">
+                <a:solidFill>
+                  <a:srgbClr val="7030A0"/>
+                </a:solidFill>
+                <a:latin typeface="Courier New" panose="02070309020205020404" pitchFamily="49" charset="0"/>
+                <a:cs typeface="Courier New" panose="02070309020205020404" pitchFamily="49" charset="0"/>
+              </a:rPr>
+              <a:t>]</a:t>
+            </a:r>
+            <a:r>
+              <a:rPr lang="en-US" sz="3200" b="0" dirty="0">
+                <a:latin typeface="Courier New" panose="02070309020205020404" pitchFamily="49" charset="0"/>
+                <a:cs typeface="Courier New" panose="02070309020205020404" pitchFamily="49" charset="0"/>
+              </a:rPr>
+              <a:t> </a:t>
+            </a:r>
+            <a:endParaRPr kumimoji="0" lang="en-US" sz="3200" b="0" i="0" u="none" strike="noStrike" cap="none" spc="0" normalizeH="0" baseline="0" dirty="0">
+              <a:ln>
+                <a:noFill/>
+              </a:ln>
+              <a:solidFill>
+                <a:srgbClr val="000000"/>
+              </a:solidFill>
+              <a:effectLst/>
+              <a:uFillTx/>
+              <a:latin typeface="Courier New" panose="02070309020205020404" pitchFamily="49" charset="0"/>
+              <a:cs typeface="Courier New" panose="02070309020205020404" pitchFamily="49" charset="0"/>
+              <a:sym typeface="Gill Sans"/>
+            </a:endParaRPr>
+          </a:p>
+        </p:txBody>
+      </p:sp>
+      <p:sp>
+        <p:nvSpPr>
+          <p:cNvPr id="5" name="Right Brace 4">
+            <a:extLst>
+              <a:ext uri="{FF2B5EF4-FFF2-40B4-BE49-F238E27FC236}">
+                <a16:creationId xmlns:a16="http://schemas.microsoft.com/office/drawing/2014/main" id="{2D6A4E87-43FF-4D2A-BA0E-C24E07DCB8FD}"/>
+              </a:ext>
+            </a:extLst>
+          </p:cNvPr>
+          <p:cNvSpPr/>
+          <p:nvPr/>
+        </p:nvSpPr>
+        <p:spPr>
+          <a:xfrm rot="5400000">
+            <a:off x="9848850" y="4176317"/>
+            <a:ext cx="495300" cy="2209800"/>
+          </a:xfrm>
+          <a:prstGeom prst="rightBrace">
+            <a:avLst/>
+          </a:prstGeom>
+          <a:ln w="38100">
+            <a:solidFill>
+              <a:srgbClr val="00B050"/>
+            </a:solidFill>
+          </a:ln>
+        </p:spPr>
+        <p:style>
+          <a:lnRef idx="1">
+            <a:schemeClr val="accent5"/>
+          </a:lnRef>
+          <a:fillRef idx="0">
+            <a:schemeClr val="accent5"/>
+          </a:fillRef>
+          <a:effectRef idx="0">
+            <a:schemeClr val="accent5"/>
+          </a:effectRef>
+          <a:fontRef idx="minor">
+            <a:schemeClr val="tx1"/>
+          </a:fontRef>
+        </p:style>
+        <p:txBody>
+          <a:bodyPr rot="0" spcFirstLastPara="1" vertOverflow="overflow" horzOverflow="overflow" vert="horz" wrap="square" lIns="91439" tIns="45719" rIns="91439" bIns="45719" numCol="1" spcCol="38100" rtlCol="0" anchor="t">
+            <a:noAutofit/>
+          </a:bodyPr>
+          <a:lstStyle/>
+          <a:p>
+            <a:pPr marL="0" marR="0" indent="0" algn="l" defTabSz="914400" rtl="0" fontAlgn="auto" latinLnBrk="1" hangingPunct="0">
+              <a:lnSpc>
+                <a:spcPct val="100000"/>
+              </a:lnSpc>
+              <a:spcBef>
+                <a:spcPts val="0"/>
+              </a:spcBef>
+              <a:spcAft>
+                <a:spcPts val="0"/>
+              </a:spcAft>
+              <a:buClrTx/>
+              <a:buSzTx/>
+              <a:buFontTx/>
+              <a:buNone/>
+              <a:tabLst/>
+            </a:pPr>
+            <a:endParaRPr kumimoji="0" lang="en-US" sz="1800" i="0" u="none" strike="noStrike" cap="none" spc="0" normalizeH="0" baseline="0" dirty="0">
+              <a:ln>
+                <a:noFill/>
+              </a:ln>
+              <a:solidFill>
+                <a:srgbClr val="000000"/>
+              </a:solidFill>
+              <a:effectLst/>
+              <a:uFillTx/>
+            </a:endParaRPr>
+          </a:p>
+        </p:txBody>
+      </p:sp>
+      <p:pic>
+        <p:nvPicPr>
+          <p:cNvPr id="6" name="Picture 5">
+            <a:extLst>
+              <a:ext uri="{FF2B5EF4-FFF2-40B4-BE49-F238E27FC236}">
+                <a16:creationId xmlns:a16="http://schemas.microsoft.com/office/drawing/2014/main" id="{851715FA-A71D-467E-B8DD-289CFCAA666F}"/>
+              </a:ext>
+            </a:extLst>
+          </p:cNvPr>
+          <p:cNvPicPr>
+            <a:picLocks noChangeAspect="1"/>
+          </p:cNvPicPr>
+          <p:nvPr/>
+        </p:nvPicPr>
+        <p:blipFill rotWithShape="1">
+          <a:blip r:embed="rId2"/>
+          <a:srcRect t="21092" r="46289" b="33119"/>
+          <a:stretch/>
+        </p:blipFill>
+        <p:spPr>
+          <a:xfrm>
+            <a:off x="1473200" y="0"/>
+            <a:ext cx="9021912" cy="4326334"/>
+          </a:xfrm>
+          <a:prstGeom prst="rect">
+            <a:avLst/>
+          </a:prstGeom>
+        </p:spPr>
+      </p:pic>
+      <p:pic>
+        <p:nvPicPr>
+          <p:cNvPr id="2" name="Picture 1">
+            <a:extLst>
+              <a:ext uri="{FF2B5EF4-FFF2-40B4-BE49-F238E27FC236}">
+                <a16:creationId xmlns:a16="http://schemas.microsoft.com/office/drawing/2014/main" id="{B22A08E0-AC3B-4B48-BE3E-0B92D295BF21}"/>
+              </a:ext>
+            </a:extLst>
+          </p:cNvPr>
+          <p:cNvPicPr>
+            <a:picLocks noChangeAspect="1"/>
+          </p:cNvPicPr>
+          <p:nvPr/>
+        </p:nvPicPr>
+        <p:blipFill>
+          <a:blip r:embed="rId3"/>
+          <a:stretch>
+            <a:fillRect/>
+          </a:stretch>
+        </p:blipFill>
+        <p:spPr>
+          <a:xfrm>
+            <a:off x="7976950" y="5759266"/>
+            <a:ext cx="4481750" cy="3464882"/>
+          </a:xfrm>
+          <a:prstGeom prst="rect">
+            <a:avLst/>
+          </a:prstGeom>
+        </p:spPr>
+      </p:pic>
+    </p:spTree>
+    <p:extLst>
+      <p:ext uri="{BB962C8B-B14F-4D97-AF65-F5344CB8AC3E}">
+        <p14:creationId xmlns:p14="http://schemas.microsoft.com/office/powerpoint/2010/main" val="2781154066"/>
+      </p:ext>
+    </p:extLst>
+  </p:cSld>
+  <p:clrMapOvr>
+    <a:masterClrMapping/>
+  </p:clrMapOvr>
+  <p:transition spd="med"/>
+</p:sld>
+</file>
+
+<file path=ppt/slides/slide9.xml><?xml version="1.0" encoding="utf-8"?>
+<p:sld xmlns:a="http://schemas.openxmlformats.org/drawingml/2006/main" xmlns:r="http://schemas.openxmlformats.org/officeDocument/2006/relationships" xmlns:p="http://schemas.openxmlformats.org/presentationml/2006/main">
+  <p:cSld>
+    <p:spTree>
+      <p:nvGrpSpPr>
+        <p:cNvPr id="1" name=""/>
+        <p:cNvGrpSpPr/>
+        <p:nvPr/>
+      </p:nvGrpSpPr>
+      <p:grpSpPr>
+        <a:xfrm>
+          <a:off x="0" y="0"/>
+          <a:ext cx="0" cy="0"/>
+          <a:chOff x="0" y="0"/>
+          <a:chExt cx="0" cy="0"/>
+        </a:xfrm>
+      </p:grpSpPr>
+      <p:sp>
+        <p:nvSpPr>
+          <p:cNvPr id="4" name="TextBox 3">
+            <a:extLst>
+              <a:ext uri="{FF2B5EF4-FFF2-40B4-BE49-F238E27FC236}">
+                <a16:creationId xmlns:a16="http://schemas.microsoft.com/office/drawing/2014/main" id="{D019A569-23AE-45AD-9384-2FBE7FF5DD3B}"/>
+              </a:ext>
+            </a:extLst>
+          </p:cNvPr>
+          <p:cNvSpPr txBox="1"/>
+          <p:nvPr/>
+        </p:nvSpPr>
+        <p:spPr>
+          <a:xfrm>
+            <a:off x="971550" y="4336932"/>
+            <a:ext cx="11061700" cy="595035"/>
+          </a:xfrm>
+          <a:prstGeom prst="rect">
+            <a:avLst/>
+          </a:prstGeom>
+          <a:noFill/>
+          <a:ln w="12700" cap="flat">
+            <a:noFill/>
+            <a:miter lim="400000"/>
+          </a:ln>
+          <a:effectLst/>
+          <a:sp3d/>
+        </p:spPr>
+        <p:style>
+          <a:lnRef idx="0">
+            <a:scrgbClr r="0" g="0" b="0"/>
+          </a:lnRef>
+          <a:fillRef idx="0">
+            <a:scrgbClr r="0" g="0" b="0"/>
+          </a:fillRef>
+          <a:effectRef idx="0">
+            <a:scrgbClr r="0" g="0" b="0"/>
+          </a:effectRef>
+          <a:fontRef idx="none"/>
+        </p:style>
+        <p:txBody>
+          <a:bodyPr rot="0" spcFirstLastPara="1" vertOverflow="overflow" horzOverflow="overflow" vert="horz" wrap="square" lIns="50800" tIns="50800" rIns="50800" bIns="50800" numCol="1" spcCol="38100" rtlCol="0" anchor="ctr">
+            <a:spAutoFit/>
+          </a:bodyPr>
+          <a:lstStyle/>
+          <a:p>
+            <a:r>
+              <a:rPr lang="en-US" sz="3200" b="0" dirty="0">
+                <a:latin typeface="Courier New" panose="02070309020205020404" pitchFamily="49" charset="0"/>
+                <a:cs typeface="Courier New" panose="02070309020205020404" pitchFamily="49" charset="0"/>
+              </a:rPr>
+              <a:t>trees</a:t>
+            </a:r>
+            <a:r>
+              <a:rPr lang="en-US" sz="3200" dirty="0">
+                <a:solidFill>
+                  <a:srgbClr val="00B0F0"/>
+                </a:solidFill>
+                <a:latin typeface="Courier New" panose="02070309020205020404" pitchFamily="49" charset="0"/>
+                <a:cs typeface="Courier New" panose="02070309020205020404" pitchFamily="49" charset="0"/>
+              </a:rPr>
+              <a:t>[</a:t>
+            </a:r>
+            <a:r>
+              <a:rPr lang="en-US" sz="3200" b="0" dirty="0">
+                <a:latin typeface="Courier New" panose="02070309020205020404" pitchFamily="49" charset="0"/>
+                <a:cs typeface="Courier New" panose="02070309020205020404" pitchFamily="49" charset="0"/>
+              </a:rPr>
+              <a:t>trees</a:t>
+            </a:r>
+            <a:r>
+              <a:rPr lang="en-US" sz="3200" dirty="0">
+                <a:solidFill>
+                  <a:srgbClr val="FF0000"/>
+                </a:solidFill>
+                <a:latin typeface="Courier New" panose="02070309020205020404" pitchFamily="49" charset="0"/>
+                <a:cs typeface="Courier New" panose="02070309020205020404" pitchFamily="49" charset="0"/>
+              </a:rPr>
+              <a:t>[</a:t>
+            </a:r>
+            <a:r>
+              <a:rPr lang="en-US" sz="3200" b="0" dirty="0">
+                <a:latin typeface="Courier New" panose="02070309020205020404" pitchFamily="49" charset="0"/>
+                <a:cs typeface="Courier New" panose="02070309020205020404" pitchFamily="49" charset="0"/>
+              </a:rPr>
+              <a:t>"priority"</a:t>
+            </a:r>
+            <a:r>
+              <a:rPr lang="en-US" sz="3200" dirty="0">
+                <a:solidFill>
+                  <a:srgbClr val="FF0000"/>
+                </a:solidFill>
+                <a:latin typeface="Courier New" panose="02070309020205020404" pitchFamily="49" charset="0"/>
+                <a:cs typeface="Courier New" panose="02070309020205020404" pitchFamily="49" charset="0"/>
+              </a:rPr>
+              <a:t>]</a:t>
+            </a:r>
+            <a:r>
+              <a:rPr lang="en-US" sz="3200" b="0" dirty="0">
+                <a:latin typeface="Courier New" panose="02070309020205020404" pitchFamily="49" charset="0"/>
+                <a:cs typeface="Courier New" panose="02070309020205020404" pitchFamily="49" charset="0"/>
+              </a:rPr>
+              <a:t> &gt; 90</a:t>
+            </a:r>
+            <a:r>
+              <a:rPr lang="en-US" sz="3200" dirty="0">
+                <a:solidFill>
+                  <a:srgbClr val="00B0F0"/>
+                </a:solidFill>
+                <a:latin typeface="Courier New" panose="02070309020205020404" pitchFamily="49" charset="0"/>
+                <a:cs typeface="Courier New" panose="02070309020205020404" pitchFamily="49" charset="0"/>
+              </a:rPr>
+              <a:t>]</a:t>
+            </a:r>
+            <a:r>
+              <a:rPr lang="en-US" sz="3200" dirty="0">
+                <a:solidFill>
+                  <a:srgbClr val="7030A0"/>
+                </a:solidFill>
+                <a:latin typeface="Courier New" panose="02070309020205020404" pitchFamily="49" charset="0"/>
+                <a:cs typeface="Courier New" panose="02070309020205020404" pitchFamily="49" charset="0"/>
+              </a:rPr>
+              <a:t>[</a:t>
+            </a:r>
+            <a:r>
+              <a:rPr lang="en-US" sz="3200" dirty="0">
+                <a:solidFill>
+                  <a:srgbClr val="00B050"/>
+                </a:solidFill>
+                <a:latin typeface="Courier New" panose="02070309020205020404" pitchFamily="49" charset="0"/>
+                <a:cs typeface="Courier New" panose="02070309020205020404" pitchFamily="49" charset="0"/>
+              </a:rPr>
+              <a:t>[</a:t>
+            </a:r>
+            <a:r>
+              <a:rPr lang="en-US" sz="3200" b="0" dirty="0">
+                <a:latin typeface="Courier New" panose="02070309020205020404" pitchFamily="49" charset="0"/>
+                <a:cs typeface="Courier New" panose="02070309020205020404" pitchFamily="49" charset="0"/>
+              </a:rPr>
+              <a:t>"x", "y"</a:t>
+            </a:r>
+            <a:r>
+              <a:rPr lang="en-US" sz="3200" dirty="0">
+                <a:solidFill>
+                  <a:srgbClr val="00B050"/>
+                </a:solidFill>
+                <a:latin typeface="Courier New" panose="02070309020205020404" pitchFamily="49" charset="0"/>
+                <a:cs typeface="Courier New" panose="02070309020205020404" pitchFamily="49" charset="0"/>
+              </a:rPr>
+              <a:t>]</a:t>
+            </a:r>
+            <a:r>
+              <a:rPr lang="en-US" sz="3200" dirty="0">
+                <a:solidFill>
+                  <a:srgbClr val="7030A0"/>
+                </a:solidFill>
+                <a:latin typeface="Courier New" panose="02070309020205020404" pitchFamily="49" charset="0"/>
+                <a:cs typeface="Courier New" panose="02070309020205020404" pitchFamily="49" charset="0"/>
+              </a:rPr>
+              <a:t>]</a:t>
+            </a:r>
+            <a:r>
+              <a:rPr lang="en-US" sz="3200" b="0" dirty="0">
+                <a:latin typeface="Courier New" panose="02070309020205020404" pitchFamily="49" charset="0"/>
+                <a:cs typeface="Courier New" panose="02070309020205020404" pitchFamily="49" charset="0"/>
+              </a:rPr>
+              <a:t> </a:t>
+            </a:r>
+            <a:endParaRPr kumimoji="0" lang="en-US" sz="3200" b="0" i="0" u="none" strike="noStrike" cap="none" spc="0" normalizeH="0" baseline="0" dirty="0">
+              <a:ln>
+                <a:noFill/>
+              </a:ln>
+              <a:solidFill>
+                <a:srgbClr val="000000"/>
+              </a:solidFill>
+              <a:effectLst/>
+              <a:uFillTx/>
+              <a:latin typeface="Courier New" panose="02070309020205020404" pitchFamily="49" charset="0"/>
+              <a:cs typeface="Courier New" panose="02070309020205020404" pitchFamily="49" charset="0"/>
+              <a:sym typeface="Gill Sans"/>
+            </a:endParaRPr>
+          </a:p>
+        </p:txBody>
+      </p:sp>
+      <p:sp>
+        <p:nvSpPr>
+          <p:cNvPr id="5" name="Right Brace 4">
+            <a:extLst>
+              <a:ext uri="{FF2B5EF4-FFF2-40B4-BE49-F238E27FC236}">
+                <a16:creationId xmlns:a16="http://schemas.microsoft.com/office/drawing/2014/main" id="{2D6A4E87-43FF-4D2A-BA0E-C24E07DCB8FD}"/>
+              </a:ext>
+            </a:extLst>
+          </p:cNvPr>
+          <p:cNvSpPr/>
+          <p:nvPr/>
+        </p:nvSpPr>
+        <p:spPr>
+          <a:xfrm rot="5400000">
+            <a:off x="9848850" y="4176317"/>
+            <a:ext cx="495300" cy="2209800"/>
+          </a:xfrm>
+          <a:prstGeom prst="rightBrace">
+            <a:avLst/>
+          </a:prstGeom>
+          <a:ln w="38100">
+            <a:solidFill>
+              <a:srgbClr val="00B050"/>
+            </a:solidFill>
+          </a:ln>
+        </p:spPr>
+        <p:style>
+          <a:lnRef idx="1">
+            <a:schemeClr val="accent5"/>
+          </a:lnRef>
+          <a:fillRef idx="0">
+            <a:schemeClr val="accent5"/>
+          </a:fillRef>
+          <a:effectRef idx="0">
+            <a:schemeClr val="accent5"/>
+          </a:effectRef>
+          <a:fontRef idx="minor">
+            <a:schemeClr val="tx1"/>
+          </a:fontRef>
+        </p:style>
+        <p:txBody>
+          <a:bodyPr rot="0" spcFirstLastPara="1" vertOverflow="overflow" horzOverflow="overflow" vert="horz" wrap="square" lIns="91439" tIns="45719" rIns="91439" bIns="45719" numCol="1" spcCol="38100" rtlCol="0" anchor="t">
+            <a:noAutofit/>
+          </a:bodyPr>
+          <a:lstStyle/>
+          <a:p>
+            <a:pPr marL="0" marR="0" indent="0" algn="l" defTabSz="914400" rtl="0" fontAlgn="auto" latinLnBrk="1" hangingPunct="0">
+              <a:lnSpc>
+                <a:spcPct val="100000"/>
+              </a:lnSpc>
+              <a:spcBef>
+                <a:spcPts val="0"/>
+              </a:spcBef>
+              <a:spcAft>
+                <a:spcPts val="0"/>
+              </a:spcAft>
+              <a:buClrTx/>
+              <a:buSzTx/>
+              <a:buFontTx/>
+              <a:buNone/>
+              <a:tabLst/>
+            </a:pPr>
+            <a:endParaRPr kumimoji="0" lang="en-US" sz="1800" i="0" u="none" strike="noStrike" cap="none" spc="0" normalizeH="0" baseline="0" dirty="0">
+              <a:ln>
+                <a:noFill/>
+              </a:ln>
+              <a:solidFill>
+                <a:srgbClr val="000000"/>
+              </a:solidFill>
+              <a:effectLst/>
+              <a:uFillTx/>
+            </a:endParaRPr>
+          </a:p>
+        </p:txBody>
+      </p:sp>
+      <p:pic>
+        <p:nvPicPr>
+          <p:cNvPr id="6" name="Picture 5">
+            <a:extLst>
+              <a:ext uri="{FF2B5EF4-FFF2-40B4-BE49-F238E27FC236}">
+                <a16:creationId xmlns:a16="http://schemas.microsoft.com/office/drawing/2014/main" id="{851715FA-A71D-467E-B8DD-289CFCAA666F}"/>
+              </a:ext>
+            </a:extLst>
+          </p:cNvPr>
+          <p:cNvPicPr>
+            <a:picLocks noChangeAspect="1"/>
+          </p:cNvPicPr>
+          <p:nvPr/>
+        </p:nvPicPr>
+        <p:blipFill rotWithShape="1">
+          <a:blip r:embed="rId2"/>
+          <a:srcRect t="21092" r="46289" b="33119"/>
+          <a:stretch/>
+        </p:blipFill>
+        <p:spPr>
+          <a:xfrm>
+            <a:off x="1473200" y="0"/>
+            <a:ext cx="9021912" cy="4326334"/>
+          </a:xfrm>
+          <a:prstGeom prst="rect">
+            <a:avLst/>
+          </a:prstGeom>
+        </p:spPr>
+      </p:pic>
+      <p:sp>
+        <p:nvSpPr>
+          <p:cNvPr id="7" name="TextBox 6">
+            <a:extLst>
+              <a:ext uri="{FF2B5EF4-FFF2-40B4-BE49-F238E27FC236}">
+                <a16:creationId xmlns:a16="http://schemas.microsoft.com/office/drawing/2014/main" id="{0625623F-2AB3-4747-BB90-E6799E279B9A}"/>
+              </a:ext>
+            </a:extLst>
+          </p:cNvPr>
+          <p:cNvSpPr txBox="1"/>
+          <p:nvPr/>
+        </p:nvSpPr>
+        <p:spPr>
+          <a:xfrm>
+            <a:off x="1111250" y="5630467"/>
+            <a:ext cx="11061700" cy="595035"/>
+          </a:xfrm>
+          <a:prstGeom prst="rect">
+            <a:avLst/>
+          </a:prstGeom>
+          <a:noFill/>
+          <a:ln w="12700" cap="flat">
+            <a:noFill/>
+            <a:miter lim="400000"/>
+          </a:ln>
+          <a:effectLst/>
+          <a:sp3d/>
+        </p:spPr>
+        <p:style>
+          <a:lnRef idx="0">
+            <a:scrgbClr r="0" g="0" b="0"/>
+          </a:lnRef>
+          <a:fillRef idx="0">
+            <a:scrgbClr r="0" g="0" b="0"/>
+          </a:fillRef>
+          <a:effectRef idx="0">
+            <a:scrgbClr r="0" g="0" b="0"/>
+          </a:effectRef>
+          <a:fontRef idx="none"/>
+        </p:style>
+        <p:txBody>
+          <a:bodyPr rot="0" spcFirstLastPara="1" vertOverflow="overflow" horzOverflow="overflow" vert="horz" wrap="square" lIns="50800" tIns="50800" rIns="50800" bIns="50800" numCol="1" spcCol="38100" rtlCol="0" anchor="ctr">
+            <a:spAutoFit/>
+          </a:bodyPr>
+          <a:lstStyle/>
+          <a:p>
+            <a:r>
+              <a:rPr lang="en-US" sz="3200" dirty="0">
+                <a:solidFill>
+                  <a:srgbClr val="00B0F0"/>
+                </a:solidFill>
+                <a:latin typeface="Courier New" panose="02070309020205020404" pitchFamily="49" charset="0"/>
+                <a:cs typeface="Courier New" panose="02070309020205020404" pitchFamily="49" charset="0"/>
+              </a:rPr>
+              <a:t>       </a:t>
+            </a:r>
+            <a:r>
+              <a:rPr lang="en-US" sz="3200" dirty="0" err="1">
+                <a:solidFill>
+                  <a:srgbClr val="00B0F0"/>
+                </a:solidFill>
+                <a:latin typeface="Courier New" panose="02070309020205020404" pitchFamily="49" charset="0"/>
+                <a:cs typeface="Courier New" panose="02070309020205020404" pitchFamily="49" charset="0"/>
+              </a:rPr>
+              <a:t>DataFrame</a:t>
+            </a:r>
+            <a:r>
+              <a:rPr lang="en-US" sz="3200" dirty="0">
+                <a:solidFill>
+                  <a:srgbClr val="00B0F0"/>
+                </a:solidFill>
+                <a:latin typeface="Courier New" panose="02070309020205020404" pitchFamily="49" charset="0"/>
+                <a:cs typeface="Courier New" panose="02070309020205020404" pitchFamily="49" charset="0"/>
+              </a:rPr>
+              <a:t>           </a:t>
+            </a:r>
+            <a:r>
+              <a:rPr lang="en-US" sz="3200" dirty="0">
+                <a:solidFill>
+                  <a:srgbClr val="7030A0"/>
+                </a:solidFill>
+                <a:latin typeface="Courier New" panose="02070309020205020404" pitchFamily="49" charset="0"/>
+                <a:cs typeface="Courier New" panose="02070309020205020404" pitchFamily="49" charset="0"/>
+              </a:rPr>
+              <a:t>[</a:t>
+            </a:r>
+            <a:r>
+              <a:rPr lang="en-US" sz="3200" dirty="0">
+                <a:solidFill>
+                  <a:srgbClr val="00B050"/>
+                </a:solidFill>
+                <a:latin typeface="Courier New" panose="02070309020205020404" pitchFamily="49" charset="0"/>
+                <a:cs typeface="Courier New" panose="02070309020205020404" pitchFamily="49" charset="0"/>
+              </a:rPr>
+              <a:t>List</a:t>
+            </a:r>
+            <a:r>
+              <a:rPr lang="en-US" sz="3200" dirty="0">
+                <a:solidFill>
+                  <a:srgbClr val="7030A0"/>
+                </a:solidFill>
+                <a:latin typeface="Courier New" panose="02070309020205020404" pitchFamily="49" charset="0"/>
+                <a:cs typeface="Courier New" panose="02070309020205020404" pitchFamily="49" charset="0"/>
+              </a:rPr>
+              <a:t>]</a:t>
+            </a:r>
+            <a:r>
+              <a:rPr lang="en-US" sz="3200" b="0" dirty="0">
+                <a:latin typeface="Courier New" panose="02070309020205020404" pitchFamily="49" charset="0"/>
+                <a:cs typeface="Courier New" panose="02070309020205020404" pitchFamily="49" charset="0"/>
+              </a:rPr>
+              <a:t>      </a:t>
+            </a:r>
+            <a:endParaRPr kumimoji="0" lang="en-US" sz="3200" b="0" i="0" u="none" strike="noStrike" cap="none" spc="0" normalizeH="0" baseline="0" dirty="0">
+              <a:ln>
+                <a:noFill/>
+              </a:ln>
+              <a:solidFill>
+                <a:srgbClr val="000000"/>
+              </a:solidFill>
+              <a:effectLst/>
+              <a:uFillTx/>
+              <a:latin typeface="Courier New" panose="02070309020205020404" pitchFamily="49" charset="0"/>
+              <a:cs typeface="Courier New" panose="02070309020205020404" pitchFamily="49" charset="0"/>
+              <a:sym typeface="Gill Sans"/>
+            </a:endParaRPr>
+          </a:p>
+        </p:txBody>
+      </p:sp>
+      <p:sp>
+        <p:nvSpPr>
+          <p:cNvPr id="8" name="Right Brace 7">
+            <a:extLst>
+              <a:ext uri="{FF2B5EF4-FFF2-40B4-BE49-F238E27FC236}">
+                <a16:creationId xmlns:a16="http://schemas.microsoft.com/office/drawing/2014/main" id="{E41D51F2-9502-4075-974E-D6F03118AB3B}"/>
+              </a:ext>
+            </a:extLst>
+          </p:cNvPr>
+          <p:cNvSpPr/>
+          <p:nvPr/>
+        </p:nvSpPr>
+        <p:spPr>
+          <a:xfrm rot="5400000">
+            <a:off x="4711700" y="1693467"/>
+            <a:ext cx="495300" cy="6972300"/>
+          </a:xfrm>
+          <a:prstGeom prst="rightBrace">
+            <a:avLst/>
+          </a:prstGeom>
+          <a:ln w="38100">
+            <a:solidFill>
+              <a:srgbClr val="00B0F0"/>
+            </a:solidFill>
+          </a:ln>
+        </p:spPr>
+        <p:style>
+          <a:lnRef idx="1">
+            <a:schemeClr val="accent5"/>
+          </a:lnRef>
+          <a:fillRef idx="0">
+            <a:schemeClr val="accent5"/>
+          </a:fillRef>
+          <a:effectRef idx="0">
+            <a:schemeClr val="accent5"/>
+          </a:effectRef>
+          <a:fontRef idx="minor">
+            <a:schemeClr val="tx1"/>
+          </a:fontRef>
+        </p:style>
+        <p:txBody>
+          <a:bodyPr rot="0" spcFirstLastPara="1" vertOverflow="overflow" horzOverflow="overflow" vert="horz" wrap="square" lIns="91439" tIns="45719" rIns="91439" bIns="45719" numCol="1" spcCol="38100" rtlCol="0" anchor="t">
+            <a:noAutofit/>
+          </a:bodyPr>
+          <a:lstStyle/>
+          <a:p>
+            <a:pPr marL="0" marR="0" indent="0" algn="l" defTabSz="914400" rtl="0" fontAlgn="auto" latinLnBrk="1" hangingPunct="0">
+              <a:lnSpc>
+                <a:spcPct val="100000"/>
+              </a:lnSpc>
+              <a:spcBef>
+                <a:spcPts val="0"/>
+              </a:spcBef>
+              <a:spcAft>
+                <a:spcPts val="0"/>
+              </a:spcAft>
+              <a:buClrTx/>
+              <a:buSzTx/>
+              <a:buFontTx/>
+              <a:buNone/>
+              <a:tabLst/>
+            </a:pPr>
+            <a:endParaRPr kumimoji="0" lang="en-US" sz="1800" i="0" u="none" strike="noStrike" cap="none" spc="0" normalizeH="0" baseline="0" dirty="0">
+              <a:ln>
+                <a:noFill/>
+              </a:ln>
+              <a:solidFill>
+                <a:srgbClr val="000000"/>
+              </a:solidFill>
+              <a:effectLst/>
+              <a:uFillTx/>
+            </a:endParaRPr>
           </a:p>
         </p:txBody>
       </p:sp>
     </p:spTree>
     <p:extLst>
       <p:ext uri="{BB962C8B-B14F-4D97-AF65-F5344CB8AC3E}">
-        <p14:creationId xmlns:p14="http://schemas.microsoft.com/office/powerpoint/2010/main" val="3847275559"/>
+        <p14:creationId xmlns:p14="http://schemas.microsoft.com/office/powerpoint/2010/main" val="921071772"/>
       </p:ext>
     </p:extLst>
   </p:cSld>

</xml_diff>